<commit_message>
add DLS and IDS
</commit_message>
<xml_diff>
--- a/Presentations/AI - Graph Search.pptx
+++ b/Presentations/AI - Graph Search.pptx
@@ -5,7 +5,7 @@
     <p:sldMasterId id="2147483648" r:id="rId1"/>
   </p:sldMasterIdLst>
   <p:notesMasterIdLst>
-    <p:notesMasterId r:id="rId25"/>
+    <p:notesMasterId r:id="rId30"/>
   </p:notesMasterIdLst>
   <p:sldIdLst>
     <p:sldId id="256" r:id="rId2"/>
@@ -29,8 +29,13 @@
     <p:sldId id="297" r:id="rId20"/>
     <p:sldId id="298" r:id="rId21"/>
     <p:sldId id="299" r:id="rId22"/>
-    <p:sldId id="300" r:id="rId23"/>
-    <p:sldId id="301" r:id="rId24"/>
+    <p:sldId id="303" r:id="rId23"/>
+    <p:sldId id="300" r:id="rId24"/>
+    <p:sldId id="304" r:id="rId25"/>
+    <p:sldId id="305" r:id="rId26"/>
+    <p:sldId id="306" r:id="rId27"/>
+    <p:sldId id="307" r:id="rId28"/>
+    <p:sldId id="308" r:id="rId29"/>
   </p:sldIdLst>
   <p:sldSz cx="9144000" cy="6858000" type="screen4x3"/>
   <p:notesSz cx="6858000" cy="9144000"/>
@@ -214,7 +219,7 @@
           <a:p>
             <a:fld id="{FAF957FC-5175-49AC-8D2B-2F056FFFC1DD}" type="datetimeFigureOut">
               <a:rPr lang="en-US" smtClean="0"/>
-              <a:t>7/4/2017</a:t>
+              <a:t>7/12/2017</a:t>
             </a:fld>
             <a:endParaRPr lang="en-US"/>
           </a:p>
@@ -748,7 +753,7 @@
             <a:fld id="{1D8BD707-D9CF-40AE-B4C6-C98DA3205C09}" type="datetimeFigureOut">
               <a:rPr lang="en-US" smtClean="0"/>
               <a:pPr/>
-              <a:t>7/4/2017</a:t>
+              <a:t>7/12/2017</a:t>
             </a:fld>
             <a:endParaRPr lang="en-US"/>
           </a:p>
@@ -915,7 +920,7 @@
             <a:fld id="{1D8BD707-D9CF-40AE-B4C6-C98DA3205C09}" type="datetimeFigureOut">
               <a:rPr lang="en-US" smtClean="0"/>
               <a:pPr/>
-              <a:t>7/4/2017</a:t>
+              <a:t>7/12/2017</a:t>
             </a:fld>
             <a:endParaRPr lang="en-US"/>
           </a:p>
@@ -1092,7 +1097,7 @@
             <a:fld id="{1D8BD707-D9CF-40AE-B4C6-C98DA3205C09}" type="datetimeFigureOut">
               <a:rPr lang="en-US" smtClean="0"/>
               <a:pPr/>
-              <a:t>7/4/2017</a:t>
+              <a:t>7/12/2017</a:t>
             </a:fld>
             <a:endParaRPr lang="en-US"/>
           </a:p>
@@ -1259,7 +1264,7 @@
             <a:fld id="{1D8BD707-D9CF-40AE-B4C6-C98DA3205C09}" type="datetimeFigureOut">
               <a:rPr lang="en-US" smtClean="0"/>
               <a:pPr/>
-              <a:t>7/4/2017</a:t>
+              <a:t>7/12/2017</a:t>
             </a:fld>
             <a:endParaRPr lang="en-US"/>
           </a:p>
@@ -1502,7 +1507,7 @@
             <a:fld id="{1D8BD707-D9CF-40AE-B4C6-C98DA3205C09}" type="datetimeFigureOut">
               <a:rPr lang="en-US" smtClean="0"/>
               <a:pPr/>
-              <a:t>7/4/2017</a:t>
+              <a:t>7/12/2017</a:t>
             </a:fld>
             <a:endParaRPr lang="en-US"/>
           </a:p>
@@ -1787,7 +1792,7 @@
             <a:fld id="{1D8BD707-D9CF-40AE-B4C6-C98DA3205C09}" type="datetimeFigureOut">
               <a:rPr lang="en-US" smtClean="0"/>
               <a:pPr/>
-              <a:t>7/4/2017</a:t>
+              <a:t>7/12/2017</a:t>
             </a:fld>
             <a:endParaRPr lang="en-US"/>
           </a:p>
@@ -2206,7 +2211,7 @@
             <a:fld id="{1D8BD707-D9CF-40AE-B4C6-C98DA3205C09}" type="datetimeFigureOut">
               <a:rPr lang="en-US" smtClean="0"/>
               <a:pPr/>
-              <a:t>7/4/2017</a:t>
+              <a:t>7/12/2017</a:t>
             </a:fld>
             <a:endParaRPr lang="en-US"/>
           </a:p>
@@ -2321,7 +2326,7 @@
             <a:fld id="{1D8BD707-D9CF-40AE-B4C6-C98DA3205C09}" type="datetimeFigureOut">
               <a:rPr lang="en-US" smtClean="0"/>
               <a:pPr/>
-              <a:t>7/4/2017</a:t>
+              <a:t>7/12/2017</a:t>
             </a:fld>
             <a:endParaRPr lang="en-US"/>
           </a:p>
@@ -2413,7 +2418,7 @@
             <a:fld id="{1D8BD707-D9CF-40AE-B4C6-C98DA3205C09}" type="datetimeFigureOut">
               <a:rPr lang="en-US" smtClean="0"/>
               <a:pPr/>
-              <a:t>7/4/2017</a:t>
+              <a:t>7/12/2017</a:t>
             </a:fld>
             <a:endParaRPr lang="en-US"/>
           </a:p>
@@ -2687,7 +2692,7 @@
             <a:fld id="{1D8BD707-D9CF-40AE-B4C6-C98DA3205C09}" type="datetimeFigureOut">
               <a:rPr lang="en-US" smtClean="0"/>
               <a:pPr/>
-              <a:t>7/4/2017</a:t>
+              <a:t>7/12/2017</a:t>
             </a:fld>
             <a:endParaRPr lang="en-US"/>
           </a:p>
@@ -2937,7 +2942,7 @@
             <a:fld id="{1D8BD707-D9CF-40AE-B4C6-C98DA3205C09}" type="datetimeFigureOut">
               <a:rPr lang="en-US" smtClean="0"/>
               <a:pPr/>
-              <a:t>7/4/2017</a:t>
+              <a:t>7/12/2017</a:t>
             </a:fld>
             <a:endParaRPr lang="en-US"/>
           </a:p>
@@ -3147,7 +3152,7 @@
             <a:fld id="{1D8BD707-D9CF-40AE-B4C6-C98DA3205C09}" type="datetimeFigureOut">
               <a:rPr lang="en-US" smtClean="0"/>
               <a:pPr/>
-              <a:t>7/4/2017</a:t>
+              <a:t>7/12/2017</a:t>
             </a:fld>
             <a:endParaRPr lang="en-US"/>
           </a:p>
@@ -3587,14 +3592,34 @@
           </a:p>
           <a:p>
             <a:r>
-              <a:rPr lang="en-US" sz="2400" smtClean="0">
+              <a:rPr lang="en-US" sz="2400" dirty="0" smtClean="0">
                 <a:solidFill>
                   <a:schemeClr val="accent1">
                     <a:lumMod val="75000"/>
                   </a:schemeClr>
                 </a:solidFill>
               </a:rPr>
-              <a:t>Created by Ferlitsch</a:t>
+              <a:t>Created by </a:t>
+            </a:r>
+            <a:r>
+              <a:rPr lang="en-US" sz="2400" dirty="0" smtClean="0">
+                <a:solidFill>
+                  <a:schemeClr val="accent1">
+                    <a:lumMod val="75000"/>
+                  </a:schemeClr>
+                </a:solidFill>
+              </a:rPr>
+              <a:t>Andrew </a:t>
+            </a:r>
+            <a:r>
+              <a:rPr lang="en-US" sz="2400" dirty="0" err="1" smtClean="0">
+                <a:solidFill>
+                  <a:schemeClr val="accent1">
+                    <a:lumMod val="75000"/>
+                  </a:schemeClr>
+                </a:solidFill>
+              </a:rPr>
+              <a:t>Ferlitsch</a:t>
             </a:r>
             <a:r>
               <a:rPr lang="en-US" sz="2400" dirty="0" smtClean="0">
@@ -16094,7 +16119,7 @@
     </p:spTree>
     <p:extLst>
       <p:ext uri="{BB962C8B-B14F-4D97-AF65-F5344CB8AC3E}">
-        <p14:creationId xmlns:p14="http://schemas.microsoft.com/office/powerpoint/2010/main" val="107145695"/>
+        <p14:creationId xmlns:p14="http://schemas.microsoft.com/office/powerpoint/2010/main" val="2309684310"/>
       </p:ext>
     </p:extLst>
   </p:cSld>
@@ -16159,7 +16184,7 @@
                   </a:schemeClr>
                 </a:solidFill>
               </a:rPr>
-              <a:t>Not Covered</a:t>
+              <a:t>DLS Graph</a:t>
             </a:r>
             <a:endParaRPr lang="en-US" dirty="0">
               <a:solidFill>
@@ -16210,8 +16235,8 @@
         </p:nvSpPr>
         <p:spPr>
           <a:xfrm>
-            <a:off x="381000" y="1447800"/>
-            <a:ext cx="4740657" cy="1815882"/>
+            <a:off x="381000" y="1219200"/>
+            <a:ext cx="8652753" cy="5201424"/>
           </a:xfrm>
           <a:prstGeom prst="rect">
             <a:avLst/>
@@ -16231,15 +16256,2295 @@
             <a:r>
               <a:rPr lang="en-US" sz="2800" b="1" dirty="0" smtClean="0">
                 <a:solidFill>
+                  <a:schemeClr val="accent6">
+                    <a:lumMod val="75000"/>
+                  </a:schemeClr>
+                </a:solidFill>
+              </a:rPr>
+              <a:t>Depth Limited Search </a:t>
+            </a:r>
+            <a:r>
+              <a:rPr lang="en-US" sz="2800" b="1" dirty="0" smtClean="0">
+                <a:solidFill>
                   <a:schemeClr val="accent5">
                     <a:lumMod val="75000"/>
                   </a:schemeClr>
                 </a:solidFill>
               </a:rPr>
-              <a:t>DLS - Depth Limited Search</a:t>
-            </a:r>
-          </a:p>
-          <a:p>
+              <a:t>(DLS) is a special case where we</a:t>
+            </a:r>
+          </a:p>
+          <a:p>
+            <a:r>
+              <a:rPr lang="en-US" sz="2800" b="1" dirty="0">
+                <a:solidFill>
+                  <a:schemeClr val="accent5">
+                    <a:lumMod val="75000"/>
+                  </a:schemeClr>
+                </a:solidFill>
+              </a:rPr>
+              <a:t> </a:t>
+            </a:r>
+            <a:r>
+              <a:rPr lang="en-US" sz="2800" b="1" dirty="0" smtClean="0">
+                <a:solidFill>
+                  <a:schemeClr val="accent5">
+                    <a:lumMod val="75000"/>
+                  </a:schemeClr>
+                </a:solidFill>
+              </a:rPr>
+              <a:t>     limit (</a:t>
+            </a:r>
+            <a:r>
+              <a:rPr lang="en-US" sz="2800" b="1" dirty="0" smtClean="0">
+                <a:solidFill>
+                  <a:schemeClr val="accent6">
+                    <a:lumMod val="75000"/>
+                  </a:schemeClr>
+                </a:solidFill>
+              </a:rPr>
+              <a:t>l</a:t>
+            </a:r>
+            <a:r>
+              <a:rPr lang="en-US" sz="2800" b="1" dirty="0" smtClean="0">
+                <a:solidFill>
+                  <a:schemeClr val="accent5">
+                    <a:lumMod val="75000"/>
+                  </a:schemeClr>
+                </a:solidFill>
+              </a:rPr>
+              <a:t>) the maximum depth (</a:t>
+            </a:r>
+            <a:r>
+              <a:rPr lang="en-US" sz="2800" b="1" dirty="0" smtClean="0">
+                <a:solidFill>
+                  <a:schemeClr val="accent6">
+                    <a:lumMod val="75000"/>
+                  </a:schemeClr>
+                </a:solidFill>
+              </a:rPr>
+              <a:t>m</a:t>
+            </a:r>
+            <a:r>
+              <a:rPr lang="en-US" sz="2800" b="1" dirty="0" smtClean="0">
+                <a:solidFill>
+                  <a:schemeClr val="accent5">
+                    <a:lumMod val="75000"/>
+                  </a:schemeClr>
+                </a:solidFill>
+              </a:rPr>
+              <a:t>) the search will </a:t>
+            </a:r>
+            <a:br>
+              <a:rPr lang="en-US" sz="2800" b="1" dirty="0" smtClean="0">
+                <a:solidFill>
+                  <a:schemeClr val="accent5">
+                    <a:lumMod val="75000"/>
+                  </a:schemeClr>
+                </a:solidFill>
+              </a:rPr>
+            </a:br>
+            <a:r>
+              <a:rPr lang="en-US" sz="2800" b="1" dirty="0" smtClean="0">
+                <a:solidFill>
+                  <a:schemeClr val="accent5">
+                    <a:lumMod val="75000"/>
+                  </a:schemeClr>
+                </a:solidFill>
+              </a:rPr>
+              <a:t>      descend to.</a:t>
+            </a:r>
+          </a:p>
+          <a:p>
+            <a:endParaRPr lang="en-US" sz="2800" b="1" dirty="0">
+              <a:solidFill>
+                <a:schemeClr val="accent5">
+                  <a:lumMod val="75000"/>
+                </a:schemeClr>
+              </a:solidFill>
+            </a:endParaRPr>
+          </a:p>
+          <a:p>
+            <a:pPr marL="457200" indent="-457200">
+              <a:buFont typeface="Arial" panose="020B0604020202020204" pitchFamily="34" charset="0"/>
+              <a:buChar char="•"/>
+            </a:pPr>
+            <a:r>
+              <a:rPr lang="en-US" sz="2800" b="1" dirty="0" smtClean="0">
+                <a:solidFill>
+                  <a:schemeClr val="accent5">
+                    <a:lumMod val="75000"/>
+                  </a:schemeClr>
+                </a:solidFill>
+              </a:rPr>
+              <a:t>Used if we have prior knowledge to believe one will</a:t>
+            </a:r>
+          </a:p>
+          <a:p>
+            <a:r>
+              <a:rPr lang="en-US" sz="2800" b="1" dirty="0">
+                <a:solidFill>
+                  <a:schemeClr val="accent5">
+                    <a:lumMod val="75000"/>
+                  </a:schemeClr>
+                </a:solidFill>
+              </a:rPr>
+              <a:t> </a:t>
+            </a:r>
+            <a:r>
+              <a:rPr lang="en-US" sz="2800" b="1" dirty="0" smtClean="0">
+                <a:solidFill>
+                  <a:schemeClr val="accent5">
+                    <a:lumMod val="75000"/>
+                  </a:schemeClr>
+                </a:solidFill>
+              </a:rPr>
+              <a:t>     be found within a depth where l &lt; m.</a:t>
+            </a:r>
+            <a:endParaRPr lang="en-US" sz="2000" b="1" dirty="0" smtClean="0">
+              <a:solidFill>
+                <a:schemeClr val="accent5">
+                  <a:lumMod val="75000"/>
+                </a:schemeClr>
+              </a:solidFill>
+            </a:endParaRPr>
+          </a:p>
+          <a:p>
+            <a:endParaRPr lang="en-US" sz="2000" b="1" dirty="0">
+              <a:solidFill>
+                <a:schemeClr val="accent5">
+                  <a:lumMod val="75000"/>
+                </a:schemeClr>
+              </a:solidFill>
+            </a:endParaRPr>
+          </a:p>
+          <a:p>
+            <a:r>
+              <a:rPr lang="en-US" sz="2000" b="1" dirty="0" smtClean="0">
+                <a:solidFill>
+                  <a:schemeClr val="accent5">
+                    <a:lumMod val="75000"/>
+                  </a:schemeClr>
+                </a:solidFill>
+              </a:rPr>
+              <a:t>	</a:t>
+            </a:r>
+            <a:r>
+              <a:rPr lang="en-US" sz="2000" b="1" dirty="0" smtClean="0">
+                <a:solidFill>
+                  <a:schemeClr val="accent6">
+                    <a:lumMod val="75000"/>
+                  </a:schemeClr>
+                </a:solidFill>
+              </a:rPr>
+              <a:t>l = m, then DFS – complete, a solution will be found.</a:t>
+            </a:r>
+          </a:p>
+          <a:p>
+            <a:r>
+              <a:rPr lang="en-US" sz="2000" b="1" dirty="0">
+                <a:solidFill>
+                  <a:schemeClr val="accent6">
+                    <a:lumMod val="75000"/>
+                  </a:schemeClr>
+                </a:solidFill>
+              </a:rPr>
+              <a:t>	</a:t>
+            </a:r>
+            <a:r>
+              <a:rPr lang="en-US" sz="2000" b="1" dirty="0" smtClean="0">
+                <a:solidFill>
+                  <a:schemeClr val="accent6">
+                    <a:lumMod val="75000"/>
+                  </a:schemeClr>
+                </a:solidFill>
+              </a:rPr>
+              <a:t>l &lt; m, then DLS – not complete, a solution may be at a level &gt; l</a:t>
+            </a:r>
+            <a:endParaRPr lang="en-US" sz="2000" b="1" dirty="0" smtClean="0">
+              <a:solidFill>
+                <a:schemeClr val="accent6">
+                  <a:lumMod val="75000"/>
+                </a:schemeClr>
+              </a:solidFill>
+            </a:endParaRPr>
+          </a:p>
+          <a:p>
+            <a:endParaRPr lang="en-US" sz="2000" b="1" dirty="0">
+              <a:solidFill>
+                <a:schemeClr val="accent5">
+                  <a:lumMod val="75000"/>
+                </a:schemeClr>
+              </a:solidFill>
+            </a:endParaRPr>
+          </a:p>
+          <a:p>
+            <a:pPr marL="457200" indent="-457200">
+              <a:buFont typeface="Arial" panose="020B0604020202020204" pitchFamily="34" charset="0"/>
+              <a:buChar char="•"/>
+            </a:pPr>
+            <a:r>
+              <a:rPr lang="en-US" sz="2800" b="1" dirty="0" smtClean="0">
+                <a:solidFill>
+                  <a:schemeClr val="accent5">
+                    <a:lumMod val="75000"/>
+                  </a:schemeClr>
+                </a:solidFill>
+              </a:rPr>
+              <a:t> Useful if search space is very deep, and have high</a:t>
+            </a:r>
+          </a:p>
+          <a:p>
+            <a:r>
+              <a:rPr lang="en-US" sz="2800" b="1" dirty="0">
+                <a:solidFill>
+                  <a:schemeClr val="accent5">
+                    <a:lumMod val="75000"/>
+                  </a:schemeClr>
+                </a:solidFill>
+              </a:rPr>
+              <a:t> </a:t>
+            </a:r>
+            <a:r>
+              <a:rPr lang="en-US" sz="2800" b="1" dirty="0" smtClean="0">
+                <a:solidFill>
+                  <a:schemeClr val="accent5">
+                    <a:lumMod val="75000"/>
+                  </a:schemeClr>
+                </a:solidFill>
+              </a:rPr>
+              <a:t>      confidence that a solution or acceptable sub-optimal</a:t>
+            </a:r>
+          </a:p>
+          <a:p>
+            <a:r>
+              <a:rPr lang="en-US" sz="2800" b="1" dirty="0">
+                <a:solidFill>
+                  <a:schemeClr val="accent5">
+                    <a:lumMod val="75000"/>
+                  </a:schemeClr>
+                </a:solidFill>
+              </a:rPr>
+              <a:t> </a:t>
+            </a:r>
+            <a:r>
+              <a:rPr lang="en-US" sz="2800" b="1" dirty="0" smtClean="0">
+                <a:solidFill>
+                  <a:schemeClr val="accent5">
+                    <a:lumMod val="75000"/>
+                  </a:schemeClr>
+                </a:solidFill>
+              </a:rPr>
+              <a:t>      solution will be found within the depth limit.</a:t>
+            </a:r>
+            <a:endParaRPr lang="en-US" sz="2800" b="1" dirty="0">
+              <a:solidFill>
+                <a:schemeClr val="accent5">
+                  <a:lumMod val="75000"/>
+                </a:schemeClr>
+              </a:solidFill>
+            </a:endParaRPr>
+          </a:p>
+        </p:txBody>
+      </p:sp>
+    </p:spTree>
+    <p:extLst>
+      <p:ext uri="{BB962C8B-B14F-4D97-AF65-F5344CB8AC3E}">
+        <p14:creationId xmlns:p14="http://schemas.microsoft.com/office/powerpoint/2010/main" val="107145695"/>
+      </p:ext>
+    </p:extLst>
+  </p:cSld>
+  <p:clrMapOvr>
+    <a:masterClrMapping/>
+  </p:clrMapOvr>
+  <p:timing>
+    <p:tnLst>
+      <p:par>
+        <p:cTn id="1" dur="indefinite" restart="never" nodeType="tmRoot"/>
+      </p:par>
+    </p:tnLst>
+  </p:timing>
+</p:sld>
+</file>
+
+<file path=ppt/slides/slide24.xml><?xml version="1.0" encoding="utf-8"?>
+<p:sld xmlns:a="http://schemas.openxmlformats.org/drawingml/2006/main" xmlns:r="http://schemas.openxmlformats.org/officeDocument/2006/relationships" xmlns:p="http://schemas.openxmlformats.org/presentationml/2006/main">
+  <p:cSld>
+    <p:spTree>
+      <p:nvGrpSpPr>
+        <p:cNvPr id="1" name=""/>
+        <p:cNvGrpSpPr/>
+        <p:nvPr/>
+      </p:nvGrpSpPr>
+      <p:grpSpPr>
+        <a:xfrm>
+          <a:off x="0" y="0"/>
+          <a:ext cx="0" cy="0"/>
+          <a:chOff x="0" y="0"/>
+          <a:chExt cx="0" cy="0"/>
+        </a:xfrm>
+      </p:grpSpPr>
+      <p:sp>
+        <p:nvSpPr>
+          <p:cNvPr id="2" name="Title 1"/>
+          <p:cNvSpPr>
+            <a:spLocks noGrp="1"/>
+          </p:cNvSpPr>
+          <p:nvPr>
+            <p:ph type="title"/>
+          </p:nvPr>
+        </p:nvSpPr>
+        <p:spPr>
+          <a:xfrm>
+            <a:off x="457200" y="274638"/>
+            <a:ext cx="8305800" cy="792162"/>
+          </a:xfrm>
+        </p:spPr>
+        <p:txBody>
+          <a:bodyPr>
+            <a:normAutofit/>
+          </a:bodyPr>
+          <a:lstStyle/>
+          <a:p>
+            <a:pPr algn="l"/>
+            <a:r>
+              <a:rPr lang="en-US" dirty="0" smtClean="0">
+                <a:solidFill>
+                  <a:schemeClr val="accent1">
+                    <a:lumMod val="75000"/>
+                  </a:schemeClr>
+                </a:solidFill>
+              </a:rPr>
+              <a:t>DLS </a:t>
+            </a:r>
+            <a:r>
+              <a:rPr lang="en-US" dirty="0" smtClean="0">
+                <a:solidFill>
+                  <a:schemeClr val="accent1">
+                    <a:lumMod val="75000"/>
+                  </a:schemeClr>
+                </a:solidFill>
+              </a:rPr>
+              <a:t>Graph – Algorithm</a:t>
+            </a:r>
+            <a:endParaRPr lang="en-US" dirty="0">
+              <a:solidFill>
+                <a:schemeClr val="accent1">
+                  <a:lumMod val="75000"/>
+                </a:schemeClr>
+              </a:solidFill>
+            </a:endParaRPr>
+          </a:p>
+        </p:txBody>
+      </p:sp>
+      <p:cxnSp>
+        <p:nvCxnSpPr>
+          <p:cNvPr id="5" name="Straight Connector 4"/>
+          <p:cNvCxnSpPr/>
+          <p:nvPr/>
+        </p:nvCxnSpPr>
+        <p:spPr>
+          <a:xfrm>
+            <a:off x="0" y="990600"/>
+            <a:ext cx="9144000" cy="0"/>
+          </a:xfrm>
+          <a:prstGeom prst="line">
+            <a:avLst/>
+          </a:prstGeom>
+          <a:ln w="19050"/>
+        </p:spPr>
+        <p:style>
+          <a:lnRef idx="1">
+            <a:schemeClr val="accent1"/>
+          </a:lnRef>
+          <a:fillRef idx="0">
+            <a:schemeClr val="accent1"/>
+          </a:fillRef>
+          <a:effectRef idx="0">
+            <a:schemeClr val="accent1"/>
+          </a:effectRef>
+          <a:fontRef idx="minor">
+            <a:schemeClr val="tx1"/>
+          </a:fontRef>
+        </p:style>
+      </p:cxnSp>
+      <p:sp>
+        <p:nvSpPr>
+          <p:cNvPr id="36" name="TextBox 35"/>
+          <p:cNvSpPr txBox="1"/>
+          <p:nvPr/>
+        </p:nvSpPr>
+        <p:spPr>
+          <a:xfrm>
+            <a:off x="133350" y="991934"/>
+            <a:ext cx="8494633" cy="5909310"/>
+          </a:xfrm>
+          <a:prstGeom prst="rect">
+            <a:avLst/>
+          </a:prstGeom>
+          <a:noFill/>
+        </p:spPr>
+        <p:txBody>
+          <a:bodyPr wrap="none" rtlCol="0">
+            <a:spAutoFit/>
+          </a:bodyPr>
+          <a:lstStyle/>
+          <a:p>
+            <a:r>
+              <a:rPr lang="en-US" b="1" dirty="0" smtClean="0"/>
+              <a:t>function </a:t>
+            </a:r>
+            <a:r>
+              <a:rPr lang="en-US" b="1" dirty="0" smtClean="0"/>
+              <a:t>DLS</a:t>
+            </a:r>
+            <a:r>
+              <a:rPr lang="en-US" b="1" dirty="0"/>
+              <a:t>( root </a:t>
+            </a:r>
+            <a:r>
+              <a:rPr lang="en-US" b="1" dirty="0" smtClean="0"/>
+              <a:t>, </a:t>
+            </a:r>
+            <a:r>
+              <a:rPr lang="en-US" b="1" dirty="0" smtClean="0"/>
+              <a:t>goal, level )</a:t>
+            </a:r>
+            <a:r>
+              <a:rPr lang="en-US" dirty="0"/>
+              <a:t/>
+            </a:r>
+            <a:br>
+              <a:rPr lang="en-US" dirty="0"/>
+            </a:br>
+            <a:r>
+              <a:rPr lang="en-US" dirty="0" smtClean="0">
+                <a:solidFill>
+                  <a:srgbClr val="00B050"/>
+                </a:solidFill>
+              </a:rPr>
+              <a:t/>
+            </a:r>
+            <a:br>
+              <a:rPr lang="en-US" dirty="0" smtClean="0">
+                <a:solidFill>
+                  <a:srgbClr val="00B050"/>
+                </a:solidFill>
+              </a:rPr>
+            </a:br>
+            <a:r>
+              <a:rPr lang="en-US" dirty="0" smtClean="0">
+                <a:solidFill>
+                  <a:srgbClr val="00B050"/>
+                </a:solidFill>
+              </a:rPr>
+              <a:t>	</a:t>
+            </a:r>
+            <a:r>
+              <a:rPr lang="en-US" b="1" dirty="0"/>
+              <a:t>set level of </a:t>
+            </a:r>
+            <a:r>
+              <a:rPr lang="en-US" b="1" u="sng" dirty="0"/>
+              <a:t>root node </a:t>
+            </a:r>
+            <a:r>
+              <a:rPr lang="en-US" b="1" dirty="0" smtClean="0"/>
+              <a:t>to 1</a:t>
+            </a:r>
+            <a:endParaRPr lang="en-US" dirty="0" smtClean="0"/>
+          </a:p>
+          <a:p>
+            <a:r>
+              <a:rPr lang="en-US" b="1" dirty="0">
+                <a:solidFill>
+                  <a:srgbClr val="00B050"/>
+                </a:solidFill>
+              </a:rPr>
+              <a:t>	</a:t>
+            </a:r>
+            <a:r>
+              <a:rPr lang="en-US" b="1" dirty="0" smtClean="0"/>
+              <a:t>initialize </a:t>
+            </a:r>
+            <a:r>
+              <a:rPr lang="en-US" b="1" dirty="0" smtClean="0"/>
+              <a:t>the </a:t>
+            </a:r>
+            <a:r>
+              <a:rPr lang="en-US" b="1" u="sng" dirty="0" smtClean="0">
+                <a:solidFill>
+                  <a:schemeClr val="bg1">
+                    <a:lumMod val="50000"/>
+                  </a:schemeClr>
+                </a:solidFill>
+              </a:rPr>
+              <a:t>frontier</a:t>
+            </a:r>
+            <a:r>
+              <a:rPr lang="en-US" b="1" u="sng" dirty="0" smtClean="0"/>
+              <a:t> </a:t>
+            </a:r>
+            <a:r>
+              <a:rPr lang="en-US" b="1" dirty="0" smtClean="0"/>
+              <a:t>to the </a:t>
+            </a:r>
+            <a:r>
+              <a:rPr lang="en-US" b="1" u="sng" dirty="0" smtClean="0"/>
+              <a:t>root node</a:t>
+            </a:r>
+            <a:r>
+              <a:rPr lang="en-US" b="1" dirty="0" smtClean="0"/>
+              <a:t> </a:t>
+            </a:r>
+            <a:r>
+              <a:rPr lang="en-US" b="1" dirty="0" smtClean="0">
+                <a:solidFill>
+                  <a:schemeClr val="accent6">
+                    <a:lumMod val="50000"/>
+                  </a:schemeClr>
+                </a:solidFill>
+              </a:rPr>
+              <a:t>(Stack</a:t>
+            </a:r>
+            <a:r>
+              <a:rPr lang="en-US" b="1" dirty="0" smtClean="0">
+                <a:solidFill>
+                  <a:schemeClr val="accent6">
+                    <a:lumMod val="50000"/>
+                  </a:schemeClr>
+                </a:solidFill>
+              </a:rPr>
+              <a:t>)</a:t>
+            </a:r>
+          </a:p>
+          <a:p>
+            <a:r>
+              <a:rPr lang="en-US" b="1" dirty="0">
+                <a:solidFill>
+                  <a:schemeClr val="accent6">
+                    <a:lumMod val="50000"/>
+                  </a:schemeClr>
+                </a:solidFill>
+              </a:rPr>
+              <a:t>	</a:t>
+            </a:r>
+            <a:r>
+              <a:rPr lang="en-US" dirty="0" smtClean="0"/>
+              <a:t>	</a:t>
+            </a:r>
+          </a:p>
+          <a:p>
+            <a:r>
+              <a:rPr lang="en-US" dirty="0" smtClean="0"/>
+              <a:t>	</a:t>
+            </a:r>
+            <a:r>
+              <a:rPr lang="en-US" b="1" dirty="0" smtClean="0"/>
+              <a:t>initialize the </a:t>
+            </a:r>
+            <a:r>
+              <a:rPr lang="en-US" b="1" u="sng" dirty="0" smtClean="0"/>
+              <a:t>visited</a:t>
+            </a:r>
+            <a:r>
+              <a:rPr lang="en-US" b="1" dirty="0" smtClean="0"/>
+              <a:t> (explored) to the empty set </a:t>
+            </a:r>
+            <a:r>
+              <a:rPr lang="en-US" b="1" dirty="0" smtClean="0">
+                <a:solidFill>
+                  <a:schemeClr val="accent6">
+                    <a:lumMod val="50000"/>
+                  </a:schemeClr>
+                </a:solidFill>
+              </a:rPr>
+              <a:t>(Stack)</a:t>
+            </a:r>
+            <a:r>
+              <a:rPr lang="en-US" b="1" dirty="0" smtClean="0"/>
+              <a:t/>
+            </a:r>
+            <a:br>
+              <a:rPr lang="en-US" b="1" dirty="0" smtClean="0"/>
+            </a:br>
+            <a:endParaRPr lang="en-US" b="1" dirty="0" smtClean="0"/>
+          </a:p>
+          <a:p>
+            <a:r>
+              <a:rPr lang="en-US" b="1" dirty="0"/>
+              <a:t>	</a:t>
+            </a:r>
+            <a:r>
+              <a:rPr lang="en-US" b="1" dirty="0" smtClean="0"/>
+              <a:t>while </a:t>
+            </a:r>
+            <a:r>
+              <a:rPr lang="en-US" b="1" dirty="0" smtClean="0"/>
+              <a:t>the </a:t>
+            </a:r>
+            <a:r>
+              <a:rPr lang="en-US" b="1" u="sng" dirty="0" smtClean="0">
+                <a:solidFill>
+                  <a:schemeClr val="bg1">
+                    <a:lumMod val="50000"/>
+                  </a:schemeClr>
+                </a:solidFill>
+              </a:rPr>
+              <a:t>frontier </a:t>
+            </a:r>
+            <a:r>
+              <a:rPr lang="en-US" b="1" dirty="0" smtClean="0"/>
+              <a:t>is not empty</a:t>
+            </a:r>
+            <a:endParaRPr lang="en-US" dirty="0"/>
+          </a:p>
+          <a:p>
+            <a:r>
+              <a:rPr lang="en-US" dirty="0" smtClean="0"/>
+              <a:t>		</a:t>
+            </a:r>
+            <a:r>
+              <a:rPr lang="en-US" b="1" dirty="0" smtClean="0"/>
+              <a:t>remove </a:t>
+            </a:r>
+            <a:r>
+              <a:rPr lang="en-US" b="1" dirty="0" smtClean="0">
+                <a:solidFill>
+                  <a:schemeClr val="accent6">
+                    <a:lumMod val="50000"/>
+                  </a:schemeClr>
+                </a:solidFill>
+              </a:rPr>
+              <a:t>(pop) </a:t>
+            </a:r>
+            <a:r>
+              <a:rPr lang="en-US" b="1" dirty="0" smtClean="0"/>
+              <a:t>the next </a:t>
+            </a:r>
+            <a:r>
+              <a:rPr lang="en-US" b="1" i="1" u="sng" dirty="0" smtClean="0"/>
+              <a:t>node</a:t>
+            </a:r>
+            <a:r>
+              <a:rPr lang="en-US" b="1" dirty="0" smtClean="0"/>
+              <a:t> from the </a:t>
+            </a:r>
+            <a:r>
+              <a:rPr lang="en-US" b="1" u="sng" dirty="0" smtClean="0">
+                <a:solidFill>
+                  <a:schemeClr val="bg1">
+                    <a:lumMod val="50000"/>
+                  </a:schemeClr>
+                </a:solidFill>
+              </a:rPr>
+              <a:t>frontier</a:t>
+            </a:r>
+          </a:p>
+          <a:p>
+            <a:r>
+              <a:rPr lang="en-US" b="1" dirty="0" smtClean="0">
+                <a:solidFill>
+                  <a:schemeClr val="bg1">
+                    <a:lumMod val="50000"/>
+                  </a:schemeClr>
+                </a:solidFill>
+              </a:rPr>
+              <a:t>		</a:t>
+            </a:r>
+            <a:r>
+              <a:rPr lang="en-US" b="1" dirty="0" smtClean="0"/>
+              <a:t>add </a:t>
+            </a:r>
+            <a:r>
+              <a:rPr lang="en-US" b="1" dirty="0" smtClean="0">
+                <a:solidFill>
+                  <a:schemeClr val="accent6">
+                    <a:lumMod val="50000"/>
+                  </a:schemeClr>
+                </a:solidFill>
+              </a:rPr>
+              <a:t>(push)  </a:t>
+            </a:r>
+            <a:r>
+              <a:rPr lang="en-US" b="1" dirty="0" smtClean="0"/>
+              <a:t>the (node removed from </a:t>
+            </a:r>
+            <a:r>
+              <a:rPr lang="en-US" b="1" u="sng" dirty="0" smtClean="0">
+                <a:solidFill>
+                  <a:schemeClr val="bg1">
+                    <a:lumMod val="50000"/>
+                  </a:schemeClr>
+                </a:solidFill>
+              </a:rPr>
+              <a:t>frontier</a:t>
+            </a:r>
+            <a:r>
+              <a:rPr lang="en-US" b="1" dirty="0" smtClean="0"/>
+              <a:t>) </a:t>
+            </a:r>
+            <a:r>
+              <a:rPr lang="en-US" b="1" i="1" u="sng" dirty="0" smtClean="0"/>
+              <a:t>node</a:t>
+            </a:r>
+            <a:r>
+              <a:rPr lang="en-US" b="1" dirty="0" smtClean="0"/>
+              <a:t> to the </a:t>
+            </a:r>
+            <a:r>
+              <a:rPr lang="en-US" b="1" u="sng" dirty="0" smtClean="0"/>
+              <a:t>visited</a:t>
+            </a:r>
+          </a:p>
+          <a:p>
+            <a:r>
+              <a:rPr lang="en-US" dirty="0" smtClean="0"/>
+              <a:t/>
+            </a:r>
+            <a:br>
+              <a:rPr lang="en-US" dirty="0" smtClean="0"/>
+            </a:br>
+            <a:r>
+              <a:rPr lang="en-US" dirty="0" smtClean="0"/>
+              <a:t>		</a:t>
+            </a:r>
+            <a:r>
+              <a:rPr lang="en-US" b="1" dirty="0" smtClean="0"/>
+              <a:t>if the </a:t>
+            </a:r>
+            <a:r>
+              <a:rPr lang="en-US" b="1" i="1" u="sng" dirty="0" smtClean="0"/>
+              <a:t>node</a:t>
+            </a:r>
+            <a:r>
+              <a:rPr lang="en-US" b="1" dirty="0" smtClean="0"/>
+              <a:t> matches to </a:t>
+            </a:r>
+            <a:r>
+              <a:rPr lang="en-US" b="1" u="sng" dirty="0" smtClean="0">
+                <a:solidFill>
+                  <a:srgbClr val="00B050"/>
+                </a:solidFill>
+              </a:rPr>
+              <a:t>goal node</a:t>
+            </a:r>
+          </a:p>
+          <a:p>
+            <a:r>
+              <a:rPr lang="en-US" dirty="0"/>
+              <a:t>	</a:t>
+            </a:r>
+            <a:r>
+              <a:rPr lang="en-US" dirty="0" smtClean="0"/>
+              <a:t>		</a:t>
+            </a:r>
+            <a:r>
+              <a:rPr lang="en-US" b="1" dirty="0" smtClean="0"/>
+              <a:t>return </a:t>
+            </a:r>
+            <a:r>
+              <a:rPr lang="en-US" b="1" u="sng" dirty="0" smtClean="0">
+                <a:solidFill>
+                  <a:srgbClr val="00B050"/>
+                </a:solidFill>
+              </a:rPr>
+              <a:t>found </a:t>
+            </a:r>
+            <a:r>
+              <a:rPr lang="en-US" b="1" u="sng" dirty="0" smtClean="0">
+                <a:solidFill>
+                  <a:srgbClr val="00B050"/>
+                </a:solidFill>
+              </a:rPr>
+              <a:t>goal</a:t>
+            </a:r>
+          </a:p>
+          <a:p>
+            <a:endParaRPr lang="en-US" b="1" u="sng" dirty="0">
+              <a:solidFill>
+                <a:srgbClr val="00B050"/>
+              </a:solidFill>
+            </a:endParaRPr>
+          </a:p>
+          <a:p>
+            <a:r>
+              <a:rPr lang="en-US" b="1" dirty="0">
+                <a:solidFill>
+                  <a:srgbClr val="00B050"/>
+                </a:solidFill>
+              </a:rPr>
+              <a:t>	</a:t>
+            </a:r>
+            <a:r>
+              <a:rPr lang="en-US" b="1" dirty="0" smtClean="0">
+                <a:solidFill>
+                  <a:srgbClr val="00B050"/>
+                </a:solidFill>
+              </a:rPr>
+              <a:t>	</a:t>
+            </a:r>
+            <a:r>
+              <a:rPr lang="en-US" b="1" dirty="0" smtClean="0"/>
+              <a:t>if level of </a:t>
+            </a:r>
+            <a:r>
+              <a:rPr lang="en-US" b="1" i="1" u="sng" dirty="0" smtClean="0"/>
+              <a:t>node</a:t>
+            </a:r>
+            <a:r>
+              <a:rPr lang="en-US" b="1" dirty="0" smtClean="0"/>
+              <a:t> equals level</a:t>
+            </a:r>
+          </a:p>
+          <a:p>
+            <a:r>
+              <a:rPr lang="en-US" b="1" dirty="0"/>
+              <a:t>	</a:t>
+            </a:r>
+            <a:r>
+              <a:rPr lang="en-US" b="1" dirty="0" smtClean="0"/>
+              <a:t>		conti</a:t>
+            </a:r>
+            <a:r>
+              <a:rPr lang="en-US" b="1" dirty="0" smtClean="0"/>
+              <a:t>nue: </a:t>
+            </a:r>
+            <a:r>
+              <a:rPr lang="en-US" b="1" dirty="0" smtClean="0"/>
+              <a:t>skip the rest of the loop</a:t>
+            </a:r>
+            <a:endParaRPr lang="en-US" b="1" dirty="0" smtClean="0"/>
+          </a:p>
+          <a:p>
+            <a:endParaRPr lang="en-US" b="1" dirty="0"/>
+          </a:p>
+          <a:p>
+            <a:r>
+              <a:rPr lang="en-US" b="1" dirty="0" smtClean="0"/>
+              <a:t>		for each </a:t>
+            </a:r>
+            <a:r>
+              <a:rPr lang="en-US" b="1" u="sng" dirty="0" smtClean="0">
+                <a:solidFill>
+                  <a:schemeClr val="tx2">
+                    <a:lumMod val="50000"/>
+                  </a:schemeClr>
+                </a:solidFill>
+              </a:rPr>
+              <a:t>child</a:t>
+            </a:r>
+            <a:r>
+              <a:rPr lang="en-US" b="1" dirty="0" smtClean="0"/>
+              <a:t> (neighbor) of the </a:t>
+            </a:r>
+            <a:r>
+              <a:rPr lang="en-US" b="1" i="1" u="sng" dirty="0" smtClean="0"/>
+              <a:t>node</a:t>
+            </a:r>
+          </a:p>
+          <a:p>
+            <a:r>
+              <a:rPr lang="en-US" b="1" dirty="0"/>
+              <a:t>	</a:t>
+            </a:r>
+            <a:r>
+              <a:rPr lang="en-US" b="1" dirty="0" smtClean="0"/>
+              <a:t>		if </a:t>
+            </a:r>
+            <a:r>
+              <a:rPr lang="en-US" b="1" u="sng" dirty="0" smtClean="0">
+                <a:solidFill>
+                  <a:schemeClr val="tx2">
+                    <a:lumMod val="50000"/>
+                  </a:schemeClr>
+                </a:solidFill>
+              </a:rPr>
+              <a:t>child</a:t>
+            </a:r>
+            <a:r>
+              <a:rPr lang="en-US" b="1" dirty="0" smtClean="0"/>
+              <a:t> not in </a:t>
+            </a:r>
+            <a:r>
+              <a:rPr lang="en-US" b="1" u="sng" dirty="0" smtClean="0">
+                <a:solidFill>
+                  <a:schemeClr val="bg1">
+                    <a:lumMod val="50000"/>
+                  </a:schemeClr>
+                </a:solidFill>
+              </a:rPr>
+              <a:t>frontier </a:t>
+            </a:r>
+            <a:r>
+              <a:rPr lang="en-US" b="1" dirty="0" smtClean="0"/>
+              <a:t>or </a:t>
+            </a:r>
+            <a:r>
+              <a:rPr lang="en-US" b="1" u="sng" dirty="0" smtClean="0"/>
+              <a:t>visited</a:t>
+            </a:r>
+          </a:p>
+          <a:p>
+            <a:r>
+              <a:rPr lang="en-US" b="1" dirty="0" smtClean="0"/>
+              <a:t>				set level of </a:t>
+            </a:r>
+            <a:r>
+              <a:rPr lang="en-US" b="1" u="sng" dirty="0" smtClean="0">
+                <a:solidFill>
+                  <a:schemeClr val="tx2">
+                    <a:lumMod val="50000"/>
+                  </a:schemeClr>
+                </a:solidFill>
+              </a:rPr>
+              <a:t>child</a:t>
+            </a:r>
+            <a:r>
+              <a:rPr lang="en-US" b="1" dirty="0" smtClean="0"/>
+              <a:t> to level of the </a:t>
+            </a:r>
+            <a:r>
+              <a:rPr lang="en-US" b="1" i="1" u="sng" dirty="0" smtClean="0"/>
+              <a:t>node</a:t>
+            </a:r>
+            <a:r>
+              <a:rPr lang="en-US" b="1" dirty="0" smtClean="0"/>
+              <a:t> + 1</a:t>
+            </a:r>
+            <a:endParaRPr lang="en-US" b="1" dirty="0" smtClean="0"/>
+          </a:p>
+          <a:p>
+            <a:r>
+              <a:rPr lang="en-US" b="1" dirty="0"/>
+              <a:t>	</a:t>
+            </a:r>
+            <a:r>
+              <a:rPr lang="en-US" b="1" dirty="0" smtClean="0"/>
+              <a:t>			add </a:t>
+            </a:r>
+            <a:r>
+              <a:rPr lang="en-US" b="1" dirty="0" smtClean="0">
+                <a:solidFill>
+                  <a:schemeClr val="accent6">
+                    <a:lumMod val="50000"/>
+                  </a:schemeClr>
+                </a:solidFill>
+              </a:rPr>
+              <a:t>(push)  </a:t>
+            </a:r>
+            <a:r>
+              <a:rPr lang="en-US" b="1" u="sng" dirty="0" smtClean="0">
+                <a:solidFill>
+                  <a:schemeClr val="tx2">
+                    <a:lumMod val="50000"/>
+                  </a:schemeClr>
+                </a:solidFill>
+              </a:rPr>
+              <a:t>child</a:t>
+            </a:r>
+            <a:r>
+              <a:rPr lang="en-US" b="1" dirty="0" smtClean="0"/>
+              <a:t> to the </a:t>
+            </a:r>
+            <a:r>
+              <a:rPr lang="en-US" b="1" u="sng" dirty="0" smtClean="0">
+                <a:solidFill>
+                  <a:schemeClr val="bg1">
+                    <a:lumMod val="50000"/>
+                  </a:schemeClr>
+                </a:solidFill>
+              </a:rPr>
+              <a:t>frontier</a:t>
+            </a:r>
+            <a:r>
+              <a:rPr lang="en-US" sz="1400" dirty="0" smtClean="0"/>
+              <a:t>		</a:t>
+            </a:r>
+            <a:endParaRPr lang="en-US" sz="1400" dirty="0"/>
+          </a:p>
+        </p:txBody>
+      </p:sp>
+      <p:sp>
+        <p:nvSpPr>
+          <p:cNvPr id="3" name="TextBox 2"/>
+          <p:cNvSpPr txBox="1"/>
+          <p:nvPr/>
+        </p:nvSpPr>
+        <p:spPr>
+          <a:xfrm>
+            <a:off x="7391400" y="1172909"/>
+            <a:ext cx="1339726" cy="369332"/>
+          </a:xfrm>
+          <a:prstGeom prst="rect">
+            <a:avLst/>
+          </a:prstGeom>
+          <a:noFill/>
+          <a:ln w="12700">
+            <a:solidFill>
+              <a:schemeClr val="tx1"/>
+            </a:solidFill>
+            <a:prstDash val="dash"/>
+          </a:ln>
+        </p:spPr>
+        <p:txBody>
+          <a:bodyPr wrap="none" rtlCol="0">
+            <a:spAutoFit/>
+          </a:bodyPr>
+          <a:lstStyle/>
+          <a:p>
+            <a:r>
+              <a:rPr lang="en-US" b="1" dirty="0" smtClean="0">
+                <a:solidFill>
+                  <a:schemeClr val="accent6">
+                    <a:lumMod val="50000"/>
+                  </a:schemeClr>
+                </a:solidFill>
+              </a:rPr>
+              <a:t>Stack = LIFO</a:t>
+            </a:r>
+            <a:endParaRPr lang="en-US" b="1" dirty="0">
+              <a:solidFill>
+                <a:schemeClr val="accent6">
+                  <a:lumMod val="50000"/>
+                </a:schemeClr>
+              </a:solidFill>
+            </a:endParaRPr>
+          </a:p>
+        </p:txBody>
+      </p:sp>
+      <p:sp>
+        <p:nvSpPr>
+          <p:cNvPr id="4" name="Left Arrow 3"/>
+          <p:cNvSpPr/>
+          <p:nvPr/>
+        </p:nvSpPr>
+        <p:spPr>
+          <a:xfrm>
+            <a:off x="5543550" y="1722537"/>
+            <a:ext cx="228600" cy="76200"/>
+          </a:xfrm>
+          <a:prstGeom prst="leftArrow">
+            <a:avLst/>
+          </a:prstGeom>
+          <a:solidFill>
+            <a:srgbClr val="FF0000"/>
+          </a:solidFill>
+          <a:ln>
+            <a:solidFill>
+              <a:srgbClr val="FF0000"/>
+            </a:solidFill>
+          </a:ln>
+        </p:spPr>
+        <p:style>
+          <a:lnRef idx="2">
+            <a:schemeClr val="accent1">
+              <a:shade val="50000"/>
+            </a:schemeClr>
+          </a:lnRef>
+          <a:fillRef idx="1">
+            <a:schemeClr val="accent1"/>
+          </a:fillRef>
+          <a:effectRef idx="0">
+            <a:schemeClr val="accent1"/>
+          </a:effectRef>
+          <a:fontRef idx="minor">
+            <a:schemeClr val="lt1"/>
+          </a:fontRef>
+        </p:style>
+        <p:txBody>
+          <a:bodyPr rtlCol="0" anchor="ctr"/>
+          <a:lstStyle/>
+          <a:p>
+            <a:pPr algn="ctr"/>
+            <a:endParaRPr lang="en-US"/>
+          </a:p>
+        </p:txBody>
+      </p:sp>
+      <p:sp>
+        <p:nvSpPr>
+          <p:cNvPr id="6" name="TextBox 5"/>
+          <p:cNvSpPr txBox="1"/>
+          <p:nvPr/>
+        </p:nvSpPr>
+        <p:spPr>
+          <a:xfrm>
+            <a:off x="5867400" y="1606748"/>
+            <a:ext cx="2285882" cy="307777"/>
+          </a:xfrm>
+          <a:prstGeom prst="rect">
+            <a:avLst/>
+          </a:prstGeom>
+          <a:noFill/>
+        </p:spPr>
+        <p:txBody>
+          <a:bodyPr wrap="none" rtlCol="0">
+            <a:spAutoFit/>
+          </a:bodyPr>
+          <a:lstStyle/>
+          <a:p>
+            <a:r>
+              <a:rPr lang="en-US" sz="1400" dirty="0" smtClean="0">
+                <a:solidFill>
+                  <a:srgbClr val="FF0000"/>
+                </a:solidFill>
+              </a:rPr>
+              <a:t>Store node level in the node.</a:t>
+            </a:r>
+            <a:endParaRPr lang="en-US" sz="1400" dirty="0">
+              <a:solidFill>
+                <a:srgbClr val="FF0000"/>
+              </a:solidFill>
+            </a:endParaRPr>
+          </a:p>
+        </p:txBody>
+      </p:sp>
+      <p:sp>
+        <p:nvSpPr>
+          <p:cNvPr id="8" name="Left Arrow 7"/>
+          <p:cNvSpPr/>
+          <p:nvPr/>
+        </p:nvSpPr>
+        <p:spPr>
+          <a:xfrm flipH="1">
+            <a:off x="2880442" y="6364188"/>
+            <a:ext cx="209550" cy="76200"/>
+          </a:xfrm>
+          <a:prstGeom prst="leftArrow">
+            <a:avLst/>
+          </a:prstGeom>
+          <a:solidFill>
+            <a:srgbClr val="FF0000"/>
+          </a:solidFill>
+          <a:ln>
+            <a:solidFill>
+              <a:srgbClr val="FF0000"/>
+            </a:solidFill>
+          </a:ln>
+        </p:spPr>
+        <p:style>
+          <a:lnRef idx="2">
+            <a:schemeClr val="accent1">
+              <a:shade val="50000"/>
+            </a:schemeClr>
+          </a:lnRef>
+          <a:fillRef idx="1">
+            <a:schemeClr val="accent1"/>
+          </a:fillRef>
+          <a:effectRef idx="0">
+            <a:schemeClr val="accent1"/>
+          </a:effectRef>
+          <a:fontRef idx="minor">
+            <a:schemeClr val="lt1"/>
+          </a:fontRef>
+        </p:style>
+        <p:txBody>
+          <a:bodyPr rtlCol="0" anchor="ctr"/>
+          <a:lstStyle/>
+          <a:p>
+            <a:pPr algn="ctr"/>
+            <a:endParaRPr lang="en-US"/>
+          </a:p>
+        </p:txBody>
+      </p:sp>
+      <p:sp>
+        <p:nvSpPr>
+          <p:cNvPr id="9" name="TextBox 8"/>
+          <p:cNvSpPr txBox="1"/>
+          <p:nvPr/>
+        </p:nvSpPr>
+        <p:spPr>
+          <a:xfrm>
+            <a:off x="152400" y="6248400"/>
+            <a:ext cx="2735621" cy="307777"/>
+          </a:xfrm>
+          <a:prstGeom prst="rect">
+            <a:avLst/>
+          </a:prstGeom>
+          <a:noFill/>
+        </p:spPr>
+        <p:txBody>
+          <a:bodyPr wrap="none" rtlCol="0">
+            <a:spAutoFit/>
+          </a:bodyPr>
+          <a:lstStyle/>
+          <a:p>
+            <a:r>
+              <a:rPr lang="en-US" sz="1400" dirty="0" smtClean="0">
+                <a:solidFill>
+                  <a:srgbClr val="FF0000"/>
+                </a:solidFill>
+              </a:rPr>
+              <a:t>Child level is one more than parent</a:t>
+            </a:r>
+            <a:endParaRPr lang="en-US" sz="1400" dirty="0">
+              <a:solidFill>
+                <a:srgbClr val="FF0000"/>
+              </a:solidFill>
+            </a:endParaRPr>
+          </a:p>
+        </p:txBody>
+      </p:sp>
+      <p:sp>
+        <p:nvSpPr>
+          <p:cNvPr id="10" name="Left Arrow 9"/>
+          <p:cNvSpPr/>
+          <p:nvPr/>
+        </p:nvSpPr>
+        <p:spPr>
+          <a:xfrm>
+            <a:off x="3619500" y="1165587"/>
+            <a:ext cx="228600" cy="76200"/>
+          </a:xfrm>
+          <a:prstGeom prst="leftArrow">
+            <a:avLst/>
+          </a:prstGeom>
+          <a:solidFill>
+            <a:srgbClr val="FF0000"/>
+          </a:solidFill>
+          <a:ln>
+            <a:solidFill>
+              <a:srgbClr val="FF0000"/>
+            </a:solidFill>
+          </a:ln>
+        </p:spPr>
+        <p:style>
+          <a:lnRef idx="2">
+            <a:schemeClr val="accent1">
+              <a:shade val="50000"/>
+            </a:schemeClr>
+          </a:lnRef>
+          <a:fillRef idx="1">
+            <a:schemeClr val="accent1"/>
+          </a:fillRef>
+          <a:effectRef idx="0">
+            <a:schemeClr val="accent1"/>
+          </a:effectRef>
+          <a:fontRef idx="minor">
+            <a:schemeClr val="lt1"/>
+          </a:fontRef>
+        </p:style>
+        <p:txBody>
+          <a:bodyPr rtlCol="0" anchor="ctr"/>
+          <a:lstStyle/>
+          <a:p>
+            <a:pPr algn="ctr"/>
+            <a:endParaRPr lang="en-US"/>
+          </a:p>
+        </p:txBody>
+      </p:sp>
+      <p:sp>
+        <p:nvSpPr>
+          <p:cNvPr id="11" name="TextBox 10"/>
+          <p:cNvSpPr txBox="1"/>
+          <p:nvPr/>
+        </p:nvSpPr>
+        <p:spPr>
+          <a:xfrm>
+            <a:off x="3848100" y="1049798"/>
+            <a:ext cx="2685159" cy="307777"/>
+          </a:xfrm>
+          <a:prstGeom prst="rect">
+            <a:avLst/>
+          </a:prstGeom>
+          <a:noFill/>
+        </p:spPr>
+        <p:txBody>
+          <a:bodyPr wrap="none" rtlCol="0">
+            <a:spAutoFit/>
+          </a:bodyPr>
+          <a:lstStyle/>
+          <a:p>
+            <a:r>
+              <a:rPr lang="en-US" sz="1400" dirty="0" smtClean="0">
+                <a:solidFill>
+                  <a:srgbClr val="FF0000"/>
+                </a:solidFill>
+              </a:rPr>
+              <a:t>Add parameter for maximum level</a:t>
+            </a:r>
+            <a:endParaRPr lang="en-US" sz="1400" dirty="0">
+              <a:solidFill>
+                <a:srgbClr val="FF0000"/>
+              </a:solidFill>
+            </a:endParaRPr>
+          </a:p>
+        </p:txBody>
+      </p:sp>
+      <p:sp>
+        <p:nvSpPr>
+          <p:cNvPr id="12" name="TextBox 11"/>
+          <p:cNvSpPr txBox="1"/>
+          <p:nvPr/>
+        </p:nvSpPr>
+        <p:spPr>
+          <a:xfrm>
+            <a:off x="5378213" y="4870251"/>
+            <a:ext cx="3798219" cy="307777"/>
+          </a:xfrm>
+          <a:prstGeom prst="rect">
+            <a:avLst/>
+          </a:prstGeom>
+          <a:noFill/>
+        </p:spPr>
+        <p:txBody>
+          <a:bodyPr wrap="none" rtlCol="0">
+            <a:spAutoFit/>
+          </a:bodyPr>
+          <a:lstStyle/>
+          <a:p>
+            <a:r>
+              <a:rPr lang="en-US" sz="1400" dirty="0" smtClean="0">
+                <a:solidFill>
+                  <a:srgbClr val="FF0000"/>
+                </a:solidFill>
+              </a:rPr>
+              <a:t>Do not add child nodes to frontier if exceeds level</a:t>
+            </a:r>
+            <a:endParaRPr lang="en-US" sz="1400" dirty="0">
+              <a:solidFill>
+                <a:srgbClr val="FF0000"/>
+              </a:solidFill>
+            </a:endParaRPr>
+          </a:p>
+        </p:txBody>
+      </p:sp>
+      <p:sp>
+        <p:nvSpPr>
+          <p:cNvPr id="13" name="Left Arrow 12"/>
+          <p:cNvSpPr/>
+          <p:nvPr/>
+        </p:nvSpPr>
+        <p:spPr>
+          <a:xfrm>
+            <a:off x="5174776" y="4986040"/>
+            <a:ext cx="228600" cy="76200"/>
+          </a:xfrm>
+          <a:prstGeom prst="leftArrow">
+            <a:avLst/>
+          </a:prstGeom>
+          <a:solidFill>
+            <a:srgbClr val="FF0000"/>
+          </a:solidFill>
+          <a:ln>
+            <a:solidFill>
+              <a:srgbClr val="FF0000"/>
+            </a:solidFill>
+          </a:ln>
+        </p:spPr>
+        <p:style>
+          <a:lnRef idx="2">
+            <a:schemeClr val="accent1">
+              <a:shade val="50000"/>
+            </a:schemeClr>
+          </a:lnRef>
+          <a:fillRef idx="1">
+            <a:schemeClr val="accent1"/>
+          </a:fillRef>
+          <a:effectRef idx="0">
+            <a:schemeClr val="accent1"/>
+          </a:effectRef>
+          <a:fontRef idx="minor">
+            <a:schemeClr val="lt1"/>
+          </a:fontRef>
+        </p:style>
+        <p:txBody>
+          <a:bodyPr rtlCol="0" anchor="ctr"/>
+          <a:lstStyle/>
+          <a:p>
+            <a:pPr algn="ctr"/>
+            <a:endParaRPr lang="en-US"/>
+          </a:p>
+        </p:txBody>
+      </p:sp>
+    </p:spTree>
+    <p:extLst>
+      <p:ext uri="{BB962C8B-B14F-4D97-AF65-F5344CB8AC3E}">
+        <p14:creationId xmlns:p14="http://schemas.microsoft.com/office/powerpoint/2010/main" val="1640775062"/>
+      </p:ext>
+    </p:extLst>
+  </p:cSld>
+  <p:clrMapOvr>
+    <a:masterClrMapping/>
+  </p:clrMapOvr>
+  <p:timing>
+    <p:tnLst>
+      <p:par>
+        <p:cTn id="1" dur="indefinite" restart="never" nodeType="tmRoot"/>
+      </p:par>
+    </p:tnLst>
+  </p:timing>
+</p:sld>
+</file>
+
+<file path=ppt/slides/slide25.xml><?xml version="1.0" encoding="utf-8"?>
+<p:sld xmlns:a="http://schemas.openxmlformats.org/drawingml/2006/main" xmlns:r="http://schemas.openxmlformats.org/officeDocument/2006/relationships" xmlns:p="http://schemas.openxmlformats.org/presentationml/2006/main">
+  <p:cSld>
+    <p:spTree>
+      <p:nvGrpSpPr>
+        <p:cNvPr id="1" name=""/>
+        <p:cNvGrpSpPr/>
+        <p:nvPr/>
+      </p:nvGrpSpPr>
+      <p:grpSpPr>
+        <a:xfrm>
+          <a:off x="0" y="0"/>
+          <a:ext cx="0" cy="0"/>
+          <a:chOff x="0" y="0"/>
+          <a:chExt cx="0" cy="0"/>
+        </a:xfrm>
+      </p:grpSpPr>
+      <p:sp>
+        <p:nvSpPr>
+          <p:cNvPr id="2" name="Title 1"/>
+          <p:cNvSpPr>
+            <a:spLocks noGrp="1"/>
+          </p:cNvSpPr>
+          <p:nvPr>
+            <p:ph type="title"/>
+          </p:nvPr>
+        </p:nvSpPr>
+        <p:spPr>
+          <a:xfrm>
+            <a:off x="457200" y="274638"/>
+            <a:ext cx="8305800" cy="792162"/>
+          </a:xfrm>
+        </p:spPr>
+        <p:txBody>
+          <a:bodyPr>
+            <a:normAutofit/>
+          </a:bodyPr>
+          <a:lstStyle/>
+          <a:p>
+            <a:pPr algn="l"/>
+            <a:r>
+              <a:rPr lang="en-US" dirty="0" smtClean="0">
+                <a:solidFill>
+                  <a:schemeClr val="accent1">
+                    <a:lumMod val="75000"/>
+                  </a:schemeClr>
+                </a:solidFill>
+              </a:rPr>
+              <a:t>DLS </a:t>
+            </a:r>
+            <a:r>
+              <a:rPr lang="en-US" dirty="0" smtClean="0">
+                <a:solidFill>
+                  <a:schemeClr val="accent1">
+                    <a:lumMod val="75000"/>
+                  </a:schemeClr>
+                </a:solidFill>
+              </a:rPr>
+              <a:t>Graph – Search Complexity</a:t>
+            </a:r>
+            <a:endParaRPr lang="en-US" dirty="0">
+              <a:solidFill>
+                <a:schemeClr val="accent1">
+                  <a:lumMod val="75000"/>
+                </a:schemeClr>
+              </a:solidFill>
+            </a:endParaRPr>
+          </a:p>
+        </p:txBody>
+      </p:sp>
+      <p:cxnSp>
+        <p:nvCxnSpPr>
+          <p:cNvPr id="5" name="Straight Connector 4"/>
+          <p:cNvCxnSpPr/>
+          <p:nvPr/>
+        </p:nvCxnSpPr>
+        <p:spPr>
+          <a:xfrm>
+            <a:off x="0" y="990600"/>
+            <a:ext cx="9144000" cy="0"/>
+          </a:xfrm>
+          <a:prstGeom prst="line">
+            <a:avLst/>
+          </a:prstGeom>
+          <a:ln w="19050"/>
+        </p:spPr>
+        <p:style>
+          <a:lnRef idx="1">
+            <a:schemeClr val="accent1"/>
+          </a:lnRef>
+          <a:fillRef idx="0">
+            <a:schemeClr val="accent1"/>
+          </a:fillRef>
+          <a:effectRef idx="0">
+            <a:schemeClr val="accent1"/>
+          </a:effectRef>
+          <a:fontRef idx="minor">
+            <a:schemeClr val="tx1"/>
+          </a:fontRef>
+        </p:style>
+      </p:cxnSp>
+      <p:sp>
+        <p:nvSpPr>
+          <p:cNvPr id="36" name="TextBox 35"/>
+          <p:cNvSpPr txBox="1"/>
+          <p:nvPr/>
+        </p:nvSpPr>
+        <p:spPr>
+          <a:xfrm>
+            <a:off x="914400" y="1981199"/>
+            <a:ext cx="8083880" cy="3108543"/>
+          </a:xfrm>
+          <a:prstGeom prst="rect">
+            <a:avLst/>
+          </a:prstGeom>
+          <a:noFill/>
+        </p:spPr>
+        <p:txBody>
+          <a:bodyPr wrap="none" rtlCol="0">
+            <a:spAutoFit/>
+          </a:bodyPr>
+          <a:lstStyle/>
+          <a:p>
+            <a:r>
+              <a:rPr lang="en-US" sz="2800" b="1" dirty="0" smtClean="0">
+                <a:solidFill>
+                  <a:schemeClr val="accent5">
+                    <a:lumMod val="75000"/>
+                  </a:schemeClr>
+                </a:solidFill>
+              </a:rPr>
+              <a:t>b = maximum branches per node</a:t>
+            </a:r>
+          </a:p>
+          <a:p>
+            <a:endParaRPr lang="en-US" sz="2800" b="1" dirty="0">
+              <a:solidFill>
+                <a:schemeClr val="accent5">
+                  <a:lumMod val="75000"/>
+                </a:schemeClr>
+              </a:solidFill>
+            </a:endParaRPr>
+          </a:p>
+          <a:p>
+            <a:r>
+              <a:rPr lang="en-US" sz="2800" b="1" dirty="0" smtClean="0">
+                <a:solidFill>
+                  <a:schemeClr val="accent5">
+                    <a:lumMod val="75000"/>
+                  </a:schemeClr>
+                </a:solidFill>
+              </a:rPr>
+              <a:t>l </a:t>
+            </a:r>
+            <a:r>
+              <a:rPr lang="en-US" sz="2800" b="1" dirty="0" smtClean="0">
+                <a:solidFill>
+                  <a:schemeClr val="accent5">
+                    <a:lumMod val="75000"/>
+                  </a:schemeClr>
+                </a:solidFill>
+              </a:rPr>
+              <a:t>= </a:t>
+            </a:r>
+            <a:r>
+              <a:rPr lang="en-US" sz="2800" b="1" dirty="0" smtClean="0">
+                <a:solidFill>
+                  <a:schemeClr val="accent5">
+                    <a:lumMod val="75000"/>
+                  </a:schemeClr>
+                </a:solidFill>
+              </a:rPr>
+              <a:t>depth of limited search</a:t>
+            </a:r>
+            <a:endParaRPr lang="en-US" sz="2800" dirty="0" smtClean="0">
+              <a:solidFill>
+                <a:schemeClr val="accent5">
+                  <a:lumMod val="75000"/>
+                </a:schemeClr>
+              </a:solidFill>
+            </a:endParaRPr>
+          </a:p>
+          <a:p>
+            <a:endParaRPr lang="en-US" sz="2800" dirty="0"/>
+          </a:p>
+          <a:p>
+            <a:r>
+              <a:rPr lang="en-US" sz="2800" b="1" dirty="0" smtClean="0">
+                <a:solidFill>
+                  <a:schemeClr val="accent5">
+                    <a:lumMod val="75000"/>
+                  </a:schemeClr>
+                </a:solidFill>
+              </a:rPr>
+              <a:t>Time = </a:t>
+            </a:r>
+            <a:r>
+              <a:rPr lang="en-US" sz="2800" b="1" dirty="0" smtClean="0"/>
+              <a:t>O(</a:t>
+            </a:r>
+            <a:r>
+              <a:rPr lang="en-US" sz="2800" b="1" dirty="0" err="1" smtClean="0"/>
+              <a:t>b</a:t>
+            </a:r>
+            <a:r>
+              <a:rPr lang="en-US" sz="2800" b="1" baseline="30000" dirty="0" err="1" smtClean="0"/>
+              <a:t>l</a:t>
+            </a:r>
+            <a:r>
+              <a:rPr lang="en-US" sz="2800" b="1" dirty="0" smtClean="0"/>
+              <a:t>)  </a:t>
+            </a:r>
+            <a:r>
+              <a:rPr lang="en-US" sz="2800" b="1" dirty="0" smtClean="0"/>
+              <a:t>	</a:t>
+            </a:r>
+            <a:r>
+              <a:rPr lang="en-US" sz="2800" b="1" dirty="0" smtClean="0">
+                <a:solidFill>
+                  <a:srgbClr val="00B050"/>
+                </a:solidFill>
+              </a:rPr>
+              <a:t># </a:t>
+            </a:r>
+            <a:r>
+              <a:rPr lang="en-US" sz="2800" b="1" dirty="0" smtClean="0">
+                <a:solidFill>
+                  <a:srgbClr val="00B050"/>
+                </a:solidFill>
+              </a:rPr>
+              <a:t>better than DFS if solution found</a:t>
+            </a:r>
+            <a:endParaRPr lang="en-US" sz="2800" b="1" dirty="0" smtClean="0">
+              <a:solidFill>
+                <a:srgbClr val="00B050"/>
+              </a:solidFill>
+            </a:endParaRPr>
+          </a:p>
+          <a:p>
+            <a:endParaRPr lang="en-US" sz="2800" b="1" dirty="0">
+              <a:solidFill>
+                <a:schemeClr val="accent5">
+                  <a:lumMod val="75000"/>
+                </a:schemeClr>
+              </a:solidFill>
+            </a:endParaRPr>
+          </a:p>
+          <a:p>
+            <a:r>
+              <a:rPr lang="en-US" sz="2800" b="1" dirty="0" smtClean="0">
+                <a:solidFill>
+                  <a:schemeClr val="accent5">
+                    <a:lumMod val="75000"/>
+                  </a:schemeClr>
+                </a:solidFill>
+              </a:rPr>
+              <a:t>Space = </a:t>
+            </a:r>
+            <a:r>
+              <a:rPr lang="en-US" sz="2800" b="1" dirty="0" smtClean="0"/>
+              <a:t>O(</a:t>
+            </a:r>
+            <a:r>
+              <a:rPr lang="en-US" sz="2800" b="1" dirty="0" err="1" smtClean="0"/>
+              <a:t>bl</a:t>
+            </a:r>
+            <a:r>
+              <a:rPr lang="en-US" sz="2800" b="1" dirty="0" smtClean="0"/>
+              <a:t>)</a:t>
+            </a:r>
+            <a:r>
+              <a:rPr lang="en-US" sz="2800" b="1" dirty="0" smtClean="0"/>
+              <a:t>	</a:t>
+            </a:r>
+            <a:r>
+              <a:rPr lang="en-US" sz="2800" b="1" dirty="0" smtClean="0">
+                <a:solidFill>
+                  <a:srgbClr val="00B050"/>
+                </a:solidFill>
+              </a:rPr>
+              <a:t># better than </a:t>
+            </a:r>
+            <a:r>
+              <a:rPr lang="en-US" sz="2800" b="1" dirty="0" smtClean="0">
+                <a:solidFill>
+                  <a:srgbClr val="00B050"/>
+                </a:solidFill>
+              </a:rPr>
+              <a:t>DFS if solution found</a:t>
+            </a:r>
+            <a:endParaRPr lang="en-US" sz="2800" b="1" dirty="0">
+              <a:solidFill>
+                <a:srgbClr val="00B050"/>
+              </a:solidFill>
+            </a:endParaRPr>
+          </a:p>
+        </p:txBody>
+      </p:sp>
+    </p:spTree>
+    <p:extLst>
+      <p:ext uri="{BB962C8B-B14F-4D97-AF65-F5344CB8AC3E}">
+        <p14:creationId xmlns:p14="http://schemas.microsoft.com/office/powerpoint/2010/main" val="4277517492"/>
+      </p:ext>
+    </p:extLst>
+  </p:cSld>
+  <p:clrMapOvr>
+    <a:masterClrMapping/>
+  </p:clrMapOvr>
+  <p:timing>
+    <p:tnLst>
+      <p:par>
+        <p:cTn id="1" dur="indefinite" restart="never" nodeType="tmRoot"/>
+      </p:par>
+    </p:tnLst>
+  </p:timing>
+</p:sld>
+</file>
+
+<file path=ppt/slides/slide26.xml><?xml version="1.0" encoding="utf-8"?>
+<p:sld xmlns:a="http://schemas.openxmlformats.org/drawingml/2006/main" xmlns:r="http://schemas.openxmlformats.org/officeDocument/2006/relationships" xmlns:p="http://schemas.openxmlformats.org/presentationml/2006/main">
+  <p:cSld>
+    <p:spTree>
+      <p:nvGrpSpPr>
+        <p:cNvPr id="1" name=""/>
+        <p:cNvGrpSpPr/>
+        <p:nvPr/>
+      </p:nvGrpSpPr>
+      <p:grpSpPr>
+        <a:xfrm>
+          <a:off x="0" y="0"/>
+          <a:ext cx="0" cy="0"/>
+          <a:chOff x="0" y="0"/>
+          <a:chExt cx="0" cy="0"/>
+        </a:xfrm>
+      </p:grpSpPr>
+      <p:sp>
+        <p:nvSpPr>
+          <p:cNvPr id="2" name="Title 1"/>
+          <p:cNvSpPr>
+            <a:spLocks noGrp="1"/>
+          </p:cNvSpPr>
+          <p:nvPr>
+            <p:ph type="title"/>
+          </p:nvPr>
+        </p:nvSpPr>
+        <p:spPr>
+          <a:xfrm>
+            <a:off x="457200" y="274638"/>
+            <a:ext cx="8305800" cy="792162"/>
+          </a:xfrm>
+        </p:spPr>
+        <p:txBody>
+          <a:bodyPr>
+            <a:normAutofit/>
+          </a:bodyPr>
+          <a:lstStyle/>
+          <a:p>
+            <a:pPr algn="l"/>
+            <a:r>
+              <a:rPr lang="en-US" dirty="0" smtClean="0">
+                <a:solidFill>
+                  <a:schemeClr val="accent1">
+                    <a:lumMod val="75000"/>
+                  </a:schemeClr>
+                </a:solidFill>
+              </a:rPr>
+              <a:t>IDS Graph</a:t>
+            </a:r>
+            <a:endParaRPr lang="en-US" dirty="0">
+              <a:solidFill>
+                <a:schemeClr val="accent1">
+                  <a:lumMod val="75000"/>
+                </a:schemeClr>
+              </a:solidFill>
+            </a:endParaRPr>
+          </a:p>
+        </p:txBody>
+      </p:sp>
+      <p:cxnSp>
+        <p:nvCxnSpPr>
+          <p:cNvPr id="5" name="Straight Connector 4"/>
+          <p:cNvCxnSpPr/>
+          <p:nvPr/>
+        </p:nvCxnSpPr>
+        <p:spPr>
+          <a:xfrm>
+            <a:off x="0" y="990600"/>
+            <a:ext cx="9144000" cy="0"/>
+          </a:xfrm>
+          <a:prstGeom prst="line">
+            <a:avLst/>
+          </a:prstGeom>
+          <a:ln w="19050"/>
+        </p:spPr>
+        <p:style>
+          <a:lnRef idx="1">
+            <a:schemeClr val="accent1"/>
+          </a:lnRef>
+          <a:fillRef idx="0">
+            <a:schemeClr val="accent1"/>
+          </a:fillRef>
+          <a:effectRef idx="0">
+            <a:schemeClr val="accent1"/>
+          </a:effectRef>
+          <a:fontRef idx="minor">
+            <a:schemeClr val="tx1"/>
+          </a:fontRef>
+        </p:style>
+      </p:cxnSp>
+      <p:sp>
+        <p:nvSpPr>
+          <p:cNvPr id="36" name="TextBox 35"/>
+          <p:cNvSpPr txBox="1"/>
+          <p:nvPr/>
+        </p:nvSpPr>
+        <p:spPr>
+          <a:xfrm>
+            <a:off x="381000" y="1219200"/>
+            <a:ext cx="8681607" cy="5201424"/>
+          </a:xfrm>
+          <a:prstGeom prst="rect">
+            <a:avLst/>
+          </a:prstGeom>
+          <a:noFill/>
+        </p:spPr>
+        <p:txBody>
+          <a:bodyPr wrap="none" rtlCol="0">
+            <a:spAutoFit/>
+          </a:bodyPr>
+          <a:lstStyle/>
+          <a:p>
+            <a:pPr marL="457200" indent="-457200">
+              <a:buFont typeface="Arial" panose="020B0604020202020204" pitchFamily="34" charset="0"/>
+              <a:buChar char="•"/>
+            </a:pPr>
+            <a:r>
+              <a:rPr lang="en-US" sz="2800" b="1" dirty="0" smtClean="0">
+                <a:solidFill>
+                  <a:schemeClr val="accent6">
+                    <a:lumMod val="75000"/>
+                  </a:schemeClr>
+                </a:solidFill>
+              </a:rPr>
+              <a:t>Iterative Depth Search </a:t>
+            </a:r>
+            <a:r>
+              <a:rPr lang="en-US" sz="2800" b="1" dirty="0" smtClean="0">
+                <a:solidFill>
+                  <a:schemeClr val="accent5">
+                    <a:lumMod val="75000"/>
+                  </a:schemeClr>
+                </a:solidFill>
+              </a:rPr>
+              <a:t>(IDS) is an iterative deepening</a:t>
+            </a:r>
+          </a:p>
+          <a:p>
+            <a:r>
+              <a:rPr lang="en-US" sz="2800" b="1" dirty="0">
+                <a:solidFill>
+                  <a:schemeClr val="accent5">
+                    <a:lumMod val="75000"/>
+                  </a:schemeClr>
+                </a:solidFill>
+              </a:rPr>
+              <a:t> </a:t>
+            </a:r>
+            <a:r>
+              <a:rPr lang="en-US" sz="2800" b="1" dirty="0" smtClean="0">
+                <a:solidFill>
+                  <a:schemeClr val="accent5">
+                    <a:lumMod val="75000"/>
+                  </a:schemeClr>
+                </a:solidFill>
+              </a:rPr>
+              <a:t>     modification </a:t>
+            </a:r>
+            <a:r>
+              <a:rPr lang="en-US" sz="2800" b="1" dirty="0" smtClean="0">
+                <a:solidFill>
+                  <a:schemeClr val="accent5">
+                    <a:lumMod val="75000"/>
+                  </a:schemeClr>
+                </a:solidFill>
+              </a:rPr>
+              <a:t>to the </a:t>
+            </a:r>
+            <a:r>
+              <a:rPr lang="en-US" sz="2800" b="1" dirty="0" smtClean="0">
+                <a:solidFill>
+                  <a:schemeClr val="accent5">
+                    <a:lumMod val="75000"/>
+                  </a:schemeClr>
+                </a:solidFill>
+              </a:rPr>
+              <a:t>DLS search, but does a depth first </a:t>
+            </a:r>
+            <a:br>
+              <a:rPr lang="en-US" sz="2800" b="1" dirty="0" smtClean="0">
+                <a:solidFill>
+                  <a:schemeClr val="accent5">
+                    <a:lumMod val="75000"/>
+                  </a:schemeClr>
+                </a:solidFill>
+              </a:rPr>
+            </a:br>
+            <a:r>
+              <a:rPr lang="en-US" sz="2800" b="1" dirty="0" smtClean="0">
+                <a:solidFill>
+                  <a:schemeClr val="accent5">
+                    <a:lumMod val="75000"/>
+                  </a:schemeClr>
+                </a:solidFill>
+              </a:rPr>
+              <a:t>      search one level at a time, and then restarts from the </a:t>
+            </a:r>
+            <a:br>
+              <a:rPr lang="en-US" sz="2800" b="1" dirty="0" smtClean="0">
+                <a:solidFill>
+                  <a:schemeClr val="accent5">
+                    <a:lumMod val="75000"/>
+                  </a:schemeClr>
+                </a:solidFill>
+              </a:rPr>
+            </a:br>
+            <a:r>
+              <a:rPr lang="en-US" sz="2800" b="1" dirty="0" smtClean="0">
+                <a:solidFill>
+                  <a:schemeClr val="accent5">
+                    <a:lumMod val="75000"/>
+                  </a:schemeClr>
+                </a:solidFill>
+              </a:rPr>
+              <a:t>      top progressing to the next deeper level.</a:t>
+            </a:r>
+          </a:p>
+          <a:p>
+            <a:endParaRPr lang="en-US" sz="2800" b="1" dirty="0">
+              <a:solidFill>
+                <a:schemeClr val="accent5">
+                  <a:lumMod val="75000"/>
+                </a:schemeClr>
+              </a:solidFill>
+            </a:endParaRPr>
+          </a:p>
+          <a:p>
+            <a:pPr marL="457200" indent="-457200">
+              <a:buFont typeface="Arial" panose="020B0604020202020204" pitchFamily="34" charset="0"/>
+              <a:buChar char="•"/>
+            </a:pPr>
+            <a:r>
+              <a:rPr lang="en-US" sz="2800" b="1" dirty="0" smtClean="0">
+                <a:solidFill>
+                  <a:schemeClr val="accent5">
+                    <a:lumMod val="75000"/>
+                  </a:schemeClr>
+                </a:solidFill>
+              </a:rPr>
+              <a:t>Is this not the same as Breadth First Search!</a:t>
+            </a:r>
+            <a:endParaRPr lang="en-US" sz="2000" b="1" dirty="0" smtClean="0">
+              <a:solidFill>
+                <a:schemeClr val="accent5">
+                  <a:lumMod val="75000"/>
+                </a:schemeClr>
+              </a:solidFill>
+            </a:endParaRPr>
+          </a:p>
+          <a:p>
+            <a:endParaRPr lang="en-US" sz="2000" b="1" dirty="0">
+              <a:solidFill>
+                <a:schemeClr val="accent5">
+                  <a:lumMod val="75000"/>
+                </a:schemeClr>
+              </a:solidFill>
+            </a:endParaRPr>
+          </a:p>
+          <a:p>
+            <a:r>
+              <a:rPr lang="en-US" sz="2000" b="1" dirty="0" smtClean="0">
+                <a:solidFill>
+                  <a:schemeClr val="accent5">
+                    <a:lumMod val="75000"/>
+                  </a:schemeClr>
+                </a:solidFill>
+              </a:rPr>
+              <a:t>	</a:t>
+            </a:r>
+            <a:r>
+              <a:rPr lang="en-US" sz="2000" b="1" dirty="0" smtClean="0">
+                <a:solidFill>
+                  <a:schemeClr val="accent6">
+                    <a:lumMod val="75000"/>
+                  </a:schemeClr>
+                </a:solidFill>
+              </a:rPr>
+              <a:t>Nearly 100% of students will have this first impression.</a:t>
+            </a:r>
+          </a:p>
+          <a:p>
+            <a:r>
+              <a:rPr lang="en-US" sz="2000" b="1" dirty="0">
+                <a:solidFill>
+                  <a:schemeClr val="accent6">
+                    <a:lumMod val="75000"/>
+                  </a:schemeClr>
+                </a:solidFill>
+              </a:rPr>
+              <a:t>	</a:t>
+            </a:r>
+            <a:r>
+              <a:rPr lang="en-US" sz="2000" b="1" dirty="0" smtClean="0">
+                <a:solidFill>
+                  <a:schemeClr val="accent6">
+                    <a:lumMod val="75000"/>
+                  </a:schemeClr>
+                </a:solidFill>
+              </a:rPr>
+              <a:t>It is not!</a:t>
+            </a:r>
+          </a:p>
+          <a:p>
+            <a:endParaRPr lang="en-US" sz="2000" b="1" dirty="0">
+              <a:solidFill>
+                <a:schemeClr val="accent5">
+                  <a:lumMod val="75000"/>
+                </a:schemeClr>
+              </a:solidFill>
+            </a:endParaRPr>
+          </a:p>
+          <a:p>
+            <a:pPr marL="457200" indent="-457200">
+              <a:buFont typeface="Arial" panose="020B0604020202020204" pitchFamily="34" charset="0"/>
+              <a:buChar char="•"/>
+            </a:pPr>
+            <a:r>
+              <a:rPr lang="en-US" sz="2800" b="1" dirty="0" smtClean="0">
+                <a:solidFill>
+                  <a:schemeClr val="accent5">
+                    <a:lumMod val="75000"/>
+                  </a:schemeClr>
+                </a:solidFill>
+              </a:rPr>
+              <a:t>First impression for students is that if we search one</a:t>
+            </a:r>
+          </a:p>
+          <a:p>
+            <a:r>
+              <a:rPr lang="en-US" sz="2800" b="1" dirty="0">
+                <a:solidFill>
+                  <a:schemeClr val="accent5">
+                    <a:lumMod val="75000"/>
+                  </a:schemeClr>
+                </a:solidFill>
+              </a:rPr>
+              <a:t> </a:t>
+            </a:r>
+            <a:r>
+              <a:rPr lang="en-US" sz="2800" b="1" dirty="0" smtClean="0">
+                <a:solidFill>
+                  <a:schemeClr val="accent5">
+                    <a:lumMod val="75000"/>
+                  </a:schemeClr>
+                </a:solidFill>
+              </a:rPr>
+              <a:t>     level at a time and visit each node at that level, it</a:t>
+            </a:r>
+          </a:p>
+          <a:p>
+            <a:r>
+              <a:rPr lang="en-US" sz="2800" b="1" dirty="0">
+                <a:solidFill>
+                  <a:schemeClr val="accent5">
+                    <a:lumMod val="75000"/>
+                  </a:schemeClr>
+                </a:solidFill>
+              </a:rPr>
+              <a:t> </a:t>
+            </a:r>
+            <a:r>
+              <a:rPr lang="en-US" sz="2800" b="1" dirty="0" smtClean="0">
+                <a:solidFill>
+                  <a:schemeClr val="accent5">
+                    <a:lumMod val="75000"/>
+                  </a:schemeClr>
+                </a:solidFill>
+              </a:rPr>
+              <a:t>     must be the same as BFS.</a:t>
+            </a:r>
+            <a:endParaRPr lang="en-US" sz="2800" b="1" dirty="0">
+              <a:solidFill>
+                <a:schemeClr val="accent5">
+                  <a:lumMod val="75000"/>
+                </a:schemeClr>
+              </a:solidFill>
+            </a:endParaRPr>
+          </a:p>
+        </p:txBody>
+      </p:sp>
+    </p:spTree>
+    <p:extLst>
+      <p:ext uri="{BB962C8B-B14F-4D97-AF65-F5344CB8AC3E}">
+        <p14:creationId xmlns:p14="http://schemas.microsoft.com/office/powerpoint/2010/main" val="712514969"/>
+      </p:ext>
+    </p:extLst>
+  </p:cSld>
+  <p:clrMapOvr>
+    <a:masterClrMapping/>
+  </p:clrMapOvr>
+  <p:timing>
+    <p:tnLst>
+      <p:par>
+        <p:cTn id="1" dur="indefinite" restart="never" nodeType="tmRoot"/>
+      </p:par>
+    </p:tnLst>
+  </p:timing>
+</p:sld>
+</file>
+
+<file path=ppt/slides/slide27.xml><?xml version="1.0" encoding="utf-8"?>
+<p:sld xmlns:a="http://schemas.openxmlformats.org/drawingml/2006/main" xmlns:r="http://schemas.openxmlformats.org/officeDocument/2006/relationships" xmlns:p="http://schemas.openxmlformats.org/presentationml/2006/main">
+  <p:cSld>
+    <p:spTree>
+      <p:nvGrpSpPr>
+        <p:cNvPr id="1" name=""/>
+        <p:cNvGrpSpPr/>
+        <p:nvPr/>
+      </p:nvGrpSpPr>
+      <p:grpSpPr>
+        <a:xfrm>
+          <a:off x="0" y="0"/>
+          <a:ext cx="0" cy="0"/>
+          <a:chOff x="0" y="0"/>
+          <a:chExt cx="0" cy="0"/>
+        </a:xfrm>
+      </p:grpSpPr>
+      <p:sp>
+        <p:nvSpPr>
+          <p:cNvPr id="2" name="Title 1"/>
+          <p:cNvSpPr>
+            <a:spLocks noGrp="1"/>
+          </p:cNvSpPr>
+          <p:nvPr>
+            <p:ph type="title"/>
+          </p:nvPr>
+        </p:nvSpPr>
+        <p:spPr>
+          <a:xfrm>
+            <a:off x="457200" y="274638"/>
+            <a:ext cx="8305800" cy="792162"/>
+          </a:xfrm>
+        </p:spPr>
+        <p:txBody>
+          <a:bodyPr>
+            <a:normAutofit/>
+          </a:bodyPr>
+          <a:lstStyle/>
+          <a:p>
+            <a:pPr algn="l"/>
+            <a:r>
+              <a:rPr lang="en-US" dirty="0" smtClean="0">
+                <a:solidFill>
+                  <a:schemeClr val="accent1">
+                    <a:lumMod val="75000"/>
+                  </a:schemeClr>
+                </a:solidFill>
+              </a:rPr>
+              <a:t>Why is IDS not BFS?</a:t>
+            </a:r>
+            <a:endParaRPr lang="en-US" dirty="0">
+              <a:solidFill>
+                <a:schemeClr val="accent1">
+                  <a:lumMod val="75000"/>
+                </a:schemeClr>
+              </a:solidFill>
+            </a:endParaRPr>
+          </a:p>
+        </p:txBody>
+      </p:sp>
+      <p:cxnSp>
+        <p:nvCxnSpPr>
+          <p:cNvPr id="5" name="Straight Connector 4"/>
+          <p:cNvCxnSpPr/>
+          <p:nvPr/>
+        </p:nvCxnSpPr>
+        <p:spPr>
+          <a:xfrm>
+            <a:off x="0" y="990600"/>
+            <a:ext cx="9144000" cy="0"/>
+          </a:xfrm>
+          <a:prstGeom prst="line">
+            <a:avLst/>
+          </a:prstGeom>
+          <a:ln w="19050"/>
+        </p:spPr>
+        <p:style>
+          <a:lnRef idx="1">
+            <a:schemeClr val="accent1"/>
+          </a:lnRef>
+          <a:fillRef idx="0">
+            <a:schemeClr val="accent1"/>
+          </a:fillRef>
+          <a:effectRef idx="0">
+            <a:schemeClr val="accent1"/>
+          </a:effectRef>
+          <a:fontRef idx="minor">
+            <a:schemeClr val="tx1"/>
+          </a:fontRef>
+        </p:style>
+      </p:cxnSp>
+      <p:sp>
+        <p:nvSpPr>
+          <p:cNvPr id="36" name="TextBox 35"/>
+          <p:cNvSpPr txBox="1"/>
+          <p:nvPr/>
+        </p:nvSpPr>
+        <p:spPr>
+          <a:xfrm>
+            <a:off x="381000" y="1219200"/>
+            <a:ext cx="8343566" cy="5693866"/>
+          </a:xfrm>
+          <a:prstGeom prst="rect">
+            <a:avLst/>
+          </a:prstGeom>
+          <a:noFill/>
+        </p:spPr>
+        <p:txBody>
+          <a:bodyPr wrap="none" rtlCol="0">
+            <a:spAutoFit/>
+          </a:bodyPr>
+          <a:lstStyle/>
+          <a:p>
+            <a:pPr marL="457200" indent="-457200">
+              <a:buFont typeface="Arial" panose="020B0604020202020204" pitchFamily="34" charset="0"/>
+              <a:buChar char="•"/>
+            </a:pPr>
+            <a:r>
+              <a:rPr lang="en-US" sz="2800" b="1" dirty="0" smtClean="0">
+                <a:solidFill>
+                  <a:schemeClr val="accent5">
+                    <a:lumMod val="75000"/>
+                  </a:schemeClr>
+                </a:solidFill>
+              </a:rPr>
+              <a:t>BFS and IDS both move down the search space one </a:t>
+            </a:r>
+          </a:p>
+          <a:p>
+            <a:r>
+              <a:rPr lang="en-US" sz="2800" b="1" dirty="0">
+                <a:solidFill>
+                  <a:schemeClr val="accent5">
+                    <a:lumMod val="75000"/>
+                  </a:schemeClr>
+                </a:solidFill>
+              </a:rPr>
+              <a:t> </a:t>
+            </a:r>
+            <a:r>
+              <a:rPr lang="en-US" sz="2800" b="1" dirty="0" smtClean="0">
+                <a:solidFill>
+                  <a:schemeClr val="accent5">
+                    <a:lumMod val="75000"/>
+                  </a:schemeClr>
+                </a:solidFill>
+              </a:rPr>
+              <a:t>     level at a time.</a:t>
+            </a:r>
             <a:endParaRPr lang="en-US" sz="2800" b="1" dirty="0" smtClean="0">
               <a:solidFill>
                 <a:schemeClr val="accent5">
@@ -16249,23 +18554,27 @@
             </a:endParaRPr>
           </a:p>
           <a:p>
-            <a:pPr marL="457200" indent="-457200">
-              <a:buFont typeface="Arial" panose="020B0604020202020204" pitchFamily="34" charset="0"/>
-              <a:buChar char="•"/>
-            </a:pPr>
+            <a:r>
+              <a:rPr lang="en-US" sz="2800" b="1" dirty="0">
+                <a:solidFill>
+                  <a:schemeClr val="accent6">
+                    <a:lumMod val="75000"/>
+                  </a:schemeClr>
+                </a:solidFill>
+              </a:rPr>
+              <a:t> </a:t>
+            </a:r>
             <a:r>
               <a:rPr lang="en-US" sz="2800" b="1" dirty="0" smtClean="0">
                 <a:solidFill>
-                  <a:schemeClr val="accent5">
-                    <a:lumMod val="75000"/>
-                  </a:schemeClr>
-                </a:solidFill>
-              </a:rPr>
-              <a:t>IDS - Iterative Depth Search</a:t>
-            </a:r>
-          </a:p>
-          <a:p>
-            <a:endParaRPr lang="en-US" sz="2800" b="1" dirty="0" smtClean="0">
+                  <a:schemeClr val="accent6">
+                    <a:lumMod val="75000"/>
+                  </a:schemeClr>
+                </a:solidFill>
+              </a:rPr>
+              <a:t>   </a:t>
+            </a:r>
+            <a:endParaRPr lang="en-US" sz="2800" b="1" dirty="0">
               <a:solidFill>
                 <a:schemeClr val="accent5">
                   <a:lumMod val="75000"/>
@@ -16273,12 +18582,743 @@
               </a:solidFill>
             </a:endParaRPr>
           </a:p>
+          <a:p>
+            <a:pPr marL="457200" indent="-457200">
+              <a:buFont typeface="Arial" panose="020B0604020202020204" pitchFamily="34" charset="0"/>
+              <a:buChar char="•"/>
+            </a:pPr>
+            <a:r>
+              <a:rPr lang="en-US" sz="2800" b="1" dirty="0" smtClean="0">
+                <a:solidFill>
+                  <a:schemeClr val="accent5">
+                    <a:lumMod val="75000"/>
+                  </a:schemeClr>
+                </a:solidFill>
+              </a:rPr>
+              <a:t>BFS </a:t>
+            </a:r>
+            <a:r>
+              <a:rPr lang="en-US" sz="2800" b="1" dirty="0" smtClean="0">
+                <a:solidFill>
+                  <a:schemeClr val="accent6">
+                    <a:lumMod val="75000"/>
+                  </a:schemeClr>
+                </a:solidFill>
+              </a:rPr>
+              <a:t>remembers</a:t>
+            </a:r>
+            <a:r>
+              <a:rPr lang="en-US" sz="2800" b="1" dirty="0" smtClean="0">
+                <a:solidFill>
+                  <a:schemeClr val="accent5">
+                    <a:lumMod val="75000"/>
+                  </a:schemeClr>
+                </a:solidFill>
+              </a:rPr>
+              <a:t> (space) the nodes it visited.</a:t>
+            </a:r>
+          </a:p>
+          <a:p>
+            <a:pPr marL="457200" indent="-457200">
+              <a:buFont typeface="Arial" panose="020B0604020202020204" pitchFamily="34" charset="0"/>
+              <a:buChar char="•"/>
+            </a:pPr>
+            <a:endParaRPr lang="en-US" sz="2800" b="1" dirty="0">
+              <a:solidFill>
+                <a:schemeClr val="accent5">
+                  <a:lumMod val="75000"/>
+                </a:schemeClr>
+              </a:solidFill>
+            </a:endParaRPr>
+          </a:p>
+          <a:p>
+            <a:pPr marL="457200" indent="-457200">
+              <a:buFont typeface="Arial" panose="020B0604020202020204" pitchFamily="34" charset="0"/>
+              <a:buChar char="•"/>
+            </a:pPr>
+            <a:r>
+              <a:rPr lang="en-US" sz="2800" b="1" dirty="0" smtClean="0">
+                <a:solidFill>
+                  <a:schemeClr val="accent5">
+                    <a:lumMod val="75000"/>
+                  </a:schemeClr>
+                </a:solidFill>
+              </a:rPr>
+              <a:t>IDS </a:t>
+            </a:r>
+            <a:r>
+              <a:rPr lang="en-US" sz="2800" b="1" dirty="0" smtClean="0">
+                <a:solidFill>
+                  <a:schemeClr val="accent6">
+                    <a:lumMod val="75000"/>
+                  </a:schemeClr>
+                </a:solidFill>
+              </a:rPr>
+              <a:t>does not remember</a:t>
+            </a:r>
+            <a:r>
+              <a:rPr lang="en-US" sz="2800" b="1" dirty="0" smtClean="0">
+                <a:solidFill>
+                  <a:schemeClr val="accent5">
+                    <a:lumMod val="75000"/>
+                  </a:schemeClr>
+                </a:solidFill>
+              </a:rPr>
+              <a:t> (space) the nodes it visited.</a:t>
+            </a:r>
+          </a:p>
+          <a:p>
+            <a:pPr marL="457200" indent="-457200">
+              <a:buFont typeface="Arial" panose="020B0604020202020204" pitchFamily="34" charset="0"/>
+              <a:buChar char="•"/>
+            </a:pPr>
+            <a:endParaRPr lang="en-US" sz="2800" b="1" dirty="0">
+              <a:solidFill>
+                <a:schemeClr val="accent5">
+                  <a:lumMod val="75000"/>
+                </a:schemeClr>
+              </a:solidFill>
+            </a:endParaRPr>
+          </a:p>
+          <a:p>
+            <a:pPr marL="457200" indent="-457200">
+              <a:buFont typeface="Arial" panose="020B0604020202020204" pitchFamily="34" charset="0"/>
+              <a:buChar char="•"/>
+            </a:pPr>
+            <a:r>
+              <a:rPr lang="en-US" sz="2800" b="1" dirty="0" smtClean="0">
+                <a:solidFill>
+                  <a:schemeClr val="accent5">
+                    <a:lumMod val="75000"/>
+                  </a:schemeClr>
+                </a:solidFill>
+              </a:rPr>
+              <a:t>Steps:</a:t>
+            </a:r>
+          </a:p>
+          <a:p>
+            <a:pPr marL="914400" lvl="1" indent="-457200">
+              <a:buFont typeface="Arial" panose="020B0604020202020204" pitchFamily="34" charset="0"/>
+              <a:buChar char="•"/>
+            </a:pPr>
+            <a:r>
+              <a:rPr lang="en-US" sz="2400" b="1" dirty="0" smtClean="0">
+                <a:solidFill>
+                  <a:schemeClr val="accent5">
+                    <a:lumMod val="75000"/>
+                  </a:schemeClr>
+                </a:solidFill>
+              </a:rPr>
+              <a:t>Search the root</a:t>
+            </a:r>
+          </a:p>
+          <a:p>
+            <a:pPr marL="914400" lvl="1" indent="-457200">
+              <a:buFont typeface="Arial" panose="020B0604020202020204" pitchFamily="34" charset="0"/>
+              <a:buChar char="•"/>
+            </a:pPr>
+            <a:r>
+              <a:rPr lang="en-US" sz="2400" b="1" dirty="0" smtClean="0">
+                <a:solidFill>
+                  <a:schemeClr val="accent5">
+                    <a:lumMod val="75000"/>
+                  </a:schemeClr>
+                </a:solidFill>
+              </a:rPr>
+              <a:t>Search the next level via DFS</a:t>
+            </a:r>
+          </a:p>
+          <a:p>
+            <a:pPr marL="914400" lvl="1" indent="-457200">
+              <a:buFont typeface="Arial" panose="020B0604020202020204" pitchFamily="34" charset="0"/>
+              <a:buChar char="•"/>
+            </a:pPr>
+            <a:r>
+              <a:rPr lang="en-US" sz="2400" b="1" dirty="0" smtClean="0">
+                <a:solidFill>
+                  <a:schemeClr val="accent5">
+                    <a:lumMod val="75000"/>
+                  </a:schemeClr>
+                </a:solidFill>
+              </a:rPr>
+              <a:t>Forgot all the search space (do not remember)</a:t>
+            </a:r>
+          </a:p>
+          <a:p>
+            <a:pPr marL="914400" lvl="1" indent="-457200">
+              <a:buFont typeface="Arial" panose="020B0604020202020204" pitchFamily="34" charset="0"/>
+              <a:buChar char="•"/>
+            </a:pPr>
+            <a:r>
+              <a:rPr lang="en-US" sz="2400" b="1" dirty="0" smtClean="0">
+                <a:solidFill>
+                  <a:schemeClr val="accent5">
+                    <a:lumMod val="75000"/>
+                  </a:schemeClr>
+                </a:solidFill>
+              </a:rPr>
+              <a:t>Return to the root and repeat the DFS search</a:t>
+            </a:r>
+          </a:p>
+          <a:p>
+            <a:pPr lvl="1"/>
+            <a:r>
+              <a:rPr lang="en-US" sz="2400" b="1" dirty="0">
+                <a:solidFill>
+                  <a:schemeClr val="accent5">
+                    <a:lumMod val="75000"/>
+                  </a:schemeClr>
+                </a:solidFill>
+              </a:rPr>
+              <a:t> </a:t>
+            </a:r>
+            <a:r>
+              <a:rPr lang="en-US" sz="2400" b="1" dirty="0" smtClean="0">
+                <a:solidFill>
+                  <a:schemeClr val="accent5">
+                    <a:lumMod val="75000"/>
+                  </a:schemeClr>
+                </a:solidFill>
+              </a:rPr>
+              <a:t>     down one more level than last time.</a:t>
+            </a:r>
+            <a:endParaRPr lang="en-US" sz="2400" b="1" dirty="0" smtClean="0">
+              <a:solidFill>
+                <a:schemeClr val="accent5">
+                  <a:lumMod val="75000"/>
+                </a:schemeClr>
+              </a:solidFill>
+            </a:endParaRPr>
+          </a:p>
+          <a:p>
+            <a:pPr marL="914400" lvl="1" indent="-457200">
+              <a:buFont typeface="Arial" panose="020B0604020202020204" pitchFamily="34" charset="0"/>
+              <a:buChar char="•"/>
+            </a:pPr>
+            <a:endParaRPr lang="en-US" sz="2000" b="1" dirty="0" smtClean="0">
+              <a:solidFill>
+                <a:schemeClr val="accent6">
+                  <a:lumMod val="75000"/>
+                </a:schemeClr>
+              </a:solidFill>
+            </a:endParaRPr>
+          </a:p>
         </p:txBody>
       </p:sp>
     </p:spTree>
     <p:extLst>
       <p:ext uri="{BB962C8B-B14F-4D97-AF65-F5344CB8AC3E}">
-        <p14:creationId xmlns:p14="http://schemas.microsoft.com/office/powerpoint/2010/main" val="3489427624"/>
+        <p14:creationId xmlns:p14="http://schemas.microsoft.com/office/powerpoint/2010/main" val="2539763313"/>
+      </p:ext>
+    </p:extLst>
+  </p:cSld>
+  <p:clrMapOvr>
+    <a:masterClrMapping/>
+  </p:clrMapOvr>
+  <p:timing>
+    <p:tnLst>
+      <p:par>
+        <p:cTn id="1" dur="indefinite" restart="never" nodeType="tmRoot"/>
+      </p:par>
+    </p:tnLst>
+  </p:timing>
+</p:sld>
+</file>
+
+<file path=ppt/slides/slide28.xml><?xml version="1.0" encoding="utf-8"?>
+<p:sld xmlns:a="http://schemas.openxmlformats.org/drawingml/2006/main" xmlns:r="http://schemas.openxmlformats.org/officeDocument/2006/relationships" xmlns:p="http://schemas.openxmlformats.org/presentationml/2006/main">
+  <p:cSld>
+    <p:spTree>
+      <p:nvGrpSpPr>
+        <p:cNvPr id="1" name=""/>
+        <p:cNvGrpSpPr/>
+        <p:nvPr/>
+      </p:nvGrpSpPr>
+      <p:grpSpPr>
+        <a:xfrm>
+          <a:off x="0" y="0"/>
+          <a:ext cx="0" cy="0"/>
+          <a:chOff x="0" y="0"/>
+          <a:chExt cx="0" cy="0"/>
+        </a:xfrm>
+      </p:grpSpPr>
+      <p:sp>
+        <p:nvSpPr>
+          <p:cNvPr id="2" name="Title 1"/>
+          <p:cNvSpPr>
+            <a:spLocks noGrp="1"/>
+          </p:cNvSpPr>
+          <p:nvPr>
+            <p:ph type="title"/>
+          </p:nvPr>
+        </p:nvSpPr>
+        <p:spPr>
+          <a:xfrm>
+            <a:off x="457200" y="274638"/>
+            <a:ext cx="8305800" cy="792162"/>
+          </a:xfrm>
+        </p:spPr>
+        <p:txBody>
+          <a:bodyPr>
+            <a:normAutofit/>
+          </a:bodyPr>
+          <a:lstStyle/>
+          <a:p>
+            <a:pPr algn="l"/>
+            <a:r>
+              <a:rPr lang="en-US" dirty="0" smtClean="0">
+                <a:solidFill>
+                  <a:schemeClr val="accent1">
+                    <a:lumMod val="75000"/>
+                  </a:schemeClr>
+                </a:solidFill>
+              </a:rPr>
+              <a:t>IDS </a:t>
+            </a:r>
+            <a:r>
+              <a:rPr lang="en-US" dirty="0" smtClean="0">
+                <a:solidFill>
+                  <a:schemeClr val="accent1">
+                    <a:lumMod val="75000"/>
+                  </a:schemeClr>
+                </a:solidFill>
+              </a:rPr>
+              <a:t>Graph – Search Complexity</a:t>
+            </a:r>
+            <a:endParaRPr lang="en-US" dirty="0">
+              <a:solidFill>
+                <a:schemeClr val="accent1">
+                  <a:lumMod val="75000"/>
+                </a:schemeClr>
+              </a:solidFill>
+            </a:endParaRPr>
+          </a:p>
+        </p:txBody>
+      </p:sp>
+      <p:cxnSp>
+        <p:nvCxnSpPr>
+          <p:cNvPr id="5" name="Straight Connector 4"/>
+          <p:cNvCxnSpPr/>
+          <p:nvPr/>
+        </p:nvCxnSpPr>
+        <p:spPr>
+          <a:xfrm>
+            <a:off x="0" y="990600"/>
+            <a:ext cx="9144000" cy="0"/>
+          </a:xfrm>
+          <a:prstGeom prst="line">
+            <a:avLst/>
+          </a:prstGeom>
+          <a:ln w="19050"/>
+        </p:spPr>
+        <p:style>
+          <a:lnRef idx="1">
+            <a:schemeClr val="accent1"/>
+          </a:lnRef>
+          <a:fillRef idx="0">
+            <a:schemeClr val="accent1"/>
+          </a:fillRef>
+          <a:effectRef idx="0">
+            <a:schemeClr val="accent1"/>
+          </a:effectRef>
+          <a:fontRef idx="minor">
+            <a:schemeClr val="tx1"/>
+          </a:fontRef>
+        </p:style>
+      </p:cxnSp>
+      <p:sp>
+        <p:nvSpPr>
+          <p:cNvPr id="36" name="TextBox 35"/>
+          <p:cNvSpPr txBox="1"/>
+          <p:nvPr/>
+        </p:nvSpPr>
+        <p:spPr>
+          <a:xfrm>
+            <a:off x="914400" y="2897326"/>
+            <a:ext cx="6577698" cy="3970318"/>
+          </a:xfrm>
+          <a:prstGeom prst="rect">
+            <a:avLst/>
+          </a:prstGeom>
+          <a:noFill/>
+        </p:spPr>
+        <p:txBody>
+          <a:bodyPr wrap="none" rtlCol="0">
+            <a:spAutoFit/>
+          </a:bodyPr>
+          <a:lstStyle/>
+          <a:p>
+            <a:r>
+              <a:rPr lang="en-US" sz="2800" b="1" dirty="0" smtClean="0">
+                <a:solidFill>
+                  <a:schemeClr val="accent5">
+                    <a:lumMod val="75000"/>
+                  </a:schemeClr>
+                </a:solidFill>
+              </a:rPr>
+              <a:t>b = maximum branches per node</a:t>
+            </a:r>
+          </a:p>
+          <a:p>
+            <a:endParaRPr lang="en-US" sz="2800" b="1" dirty="0">
+              <a:solidFill>
+                <a:schemeClr val="accent5">
+                  <a:lumMod val="75000"/>
+                </a:schemeClr>
+              </a:solidFill>
+            </a:endParaRPr>
+          </a:p>
+          <a:p>
+            <a:r>
+              <a:rPr lang="en-US" sz="2800" b="1" dirty="0" smtClean="0">
+                <a:solidFill>
+                  <a:schemeClr val="accent5">
+                    <a:lumMod val="75000"/>
+                  </a:schemeClr>
+                </a:solidFill>
+              </a:rPr>
+              <a:t>d </a:t>
+            </a:r>
+            <a:r>
+              <a:rPr lang="en-US" sz="2800" b="1" dirty="0" smtClean="0">
+                <a:solidFill>
+                  <a:schemeClr val="accent5">
+                    <a:lumMod val="75000"/>
+                  </a:schemeClr>
+                </a:solidFill>
+              </a:rPr>
+              <a:t>= </a:t>
+            </a:r>
+            <a:r>
+              <a:rPr lang="en-US" sz="2800" b="1" dirty="0" smtClean="0">
+                <a:solidFill>
+                  <a:schemeClr val="accent5">
+                    <a:lumMod val="75000"/>
+                  </a:schemeClr>
+                </a:solidFill>
+              </a:rPr>
+              <a:t>depth </a:t>
+            </a:r>
+            <a:r>
+              <a:rPr lang="en-US" sz="2800" b="1" dirty="0">
+                <a:solidFill>
+                  <a:schemeClr val="accent5">
+                    <a:lumMod val="75000"/>
+                  </a:schemeClr>
+                </a:solidFill>
+              </a:rPr>
+              <a:t>of the </a:t>
+            </a:r>
+            <a:r>
+              <a:rPr lang="en-US" sz="2800" b="1" dirty="0" smtClean="0">
+                <a:solidFill>
+                  <a:schemeClr val="accent5">
+                    <a:lumMod val="75000"/>
+                  </a:schemeClr>
+                </a:solidFill>
+              </a:rPr>
+              <a:t>solution</a:t>
+            </a:r>
+          </a:p>
+          <a:p>
+            <a:endParaRPr lang="en-US" sz="2800" b="1" dirty="0">
+              <a:solidFill>
+                <a:schemeClr val="accent5">
+                  <a:lumMod val="75000"/>
+                </a:schemeClr>
+              </a:solidFill>
+            </a:endParaRPr>
+          </a:p>
+          <a:p>
+            <a:r>
+              <a:rPr lang="en-US" sz="2800" b="1" dirty="0">
+                <a:solidFill>
+                  <a:schemeClr val="accent5">
+                    <a:lumMod val="75000"/>
+                  </a:schemeClr>
+                </a:solidFill>
+              </a:rPr>
+              <a:t>m = maximum depth of the search </a:t>
+            </a:r>
+            <a:r>
+              <a:rPr lang="en-US" sz="2800" b="1" dirty="0" smtClean="0">
+                <a:solidFill>
+                  <a:schemeClr val="accent5">
+                    <a:lumMod val="75000"/>
+                  </a:schemeClr>
+                </a:solidFill>
+              </a:rPr>
+              <a:t>space</a:t>
+            </a:r>
+            <a:endParaRPr lang="en-US" sz="2800" dirty="0" smtClean="0">
+              <a:solidFill>
+                <a:schemeClr val="accent5">
+                  <a:lumMod val="75000"/>
+                </a:schemeClr>
+              </a:solidFill>
+            </a:endParaRPr>
+          </a:p>
+          <a:p>
+            <a:endParaRPr lang="en-US" sz="2800" dirty="0"/>
+          </a:p>
+          <a:p>
+            <a:r>
+              <a:rPr lang="en-US" sz="2800" b="1" dirty="0" smtClean="0">
+                <a:solidFill>
+                  <a:schemeClr val="accent5">
+                    <a:lumMod val="75000"/>
+                  </a:schemeClr>
+                </a:solidFill>
+              </a:rPr>
+              <a:t>Time = </a:t>
+            </a:r>
+            <a:r>
+              <a:rPr lang="en-US" sz="2800" b="1" dirty="0" smtClean="0"/>
+              <a:t>O(</a:t>
+            </a:r>
+            <a:r>
+              <a:rPr lang="en-US" sz="2800" b="1" dirty="0" err="1" smtClean="0"/>
+              <a:t>b</a:t>
+            </a:r>
+            <a:r>
+              <a:rPr lang="en-US" sz="2800" b="1" baseline="30000" dirty="0" err="1"/>
+              <a:t>d</a:t>
+            </a:r>
+            <a:r>
+              <a:rPr lang="en-US" sz="2800" b="1" dirty="0" smtClean="0"/>
+              <a:t>)  </a:t>
+            </a:r>
+            <a:r>
+              <a:rPr lang="en-US" sz="2800" b="1" dirty="0" smtClean="0"/>
+              <a:t>	</a:t>
+            </a:r>
+            <a:r>
+              <a:rPr lang="en-US" sz="2800" b="1" dirty="0" smtClean="0">
+                <a:solidFill>
+                  <a:srgbClr val="00B050"/>
+                </a:solidFill>
+              </a:rPr>
+              <a:t># </a:t>
+            </a:r>
+            <a:r>
+              <a:rPr lang="en-US" sz="2800" b="1" dirty="0" smtClean="0">
+                <a:solidFill>
+                  <a:srgbClr val="00B050"/>
+                </a:solidFill>
+              </a:rPr>
+              <a:t>worse than DFS O(</a:t>
+            </a:r>
+            <a:r>
+              <a:rPr lang="en-US" sz="2800" b="1" dirty="0" err="1" smtClean="0">
+                <a:solidFill>
+                  <a:srgbClr val="00B050"/>
+                </a:solidFill>
+              </a:rPr>
+              <a:t>b</a:t>
+            </a:r>
+            <a:r>
+              <a:rPr lang="en-US" sz="2800" b="1" baseline="30000" dirty="0" err="1" smtClean="0">
+                <a:solidFill>
+                  <a:srgbClr val="00B050"/>
+                </a:solidFill>
+              </a:rPr>
+              <a:t>m</a:t>
+            </a:r>
+            <a:r>
+              <a:rPr lang="en-US" sz="2800" b="1" dirty="0" smtClean="0">
+                <a:solidFill>
+                  <a:srgbClr val="00B050"/>
+                </a:solidFill>
+              </a:rPr>
+              <a:t>)</a:t>
+            </a:r>
+            <a:endParaRPr lang="en-US" sz="2800" b="1" dirty="0" smtClean="0">
+              <a:solidFill>
+                <a:srgbClr val="00B050"/>
+              </a:solidFill>
+            </a:endParaRPr>
+          </a:p>
+          <a:p>
+            <a:endParaRPr lang="en-US" sz="2800" b="1" dirty="0">
+              <a:solidFill>
+                <a:schemeClr val="accent5">
+                  <a:lumMod val="75000"/>
+                </a:schemeClr>
+              </a:solidFill>
+            </a:endParaRPr>
+          </a:p>
+          <a:p>
+            <a:r>
+              <a:rPr lang="en-US" sz="2800" b="1" dirty="0" smtClean="0">
+                <a:solidFill>
+                  <a:schemeClr val="accent5">
+                    <a:lumMod val="75000"/>
+                  </a:schemeClr>
+                </a:solidFill>
+              </a:rPr>
+              <a:t>Space = </a:t>
+            </a:r>
+            <a:r>
+              <a:rPr lang="en-US" sz="2800" b="1" dirty="0" smtClean="0"/>
+              <a:t>O(d)</a:t>
+            </a:r>
+            <a:r>
+              <a:rPr lang="en-US" sz="2800" b="1" dirty="0" smtClean="0"/>
+              <a:t>	</a:t>
+            </a:r>
+            <a:r>
+              <a:rPr lang="en-US" sz="2800" b="1" dirty="0" smtClean="0">
+                <a:solidFill>
+                  <a:srgbClr val="00B050"/>
+                </a:solidFill>
+              </a:rPr>
+              <a:t># </a:t>
+            </a:r>
+            <a:r>
+              <a:rPr lang="en-US" sz="2800" b="1" dirty="0" smtClean="0">
+                <a:solidFill>
+                  <a:srgbClr val="00B050"/>
+                </a:solidFill>
+              </a:rPr>
+              <a:t>better than DFS O(</a:t>
+            </a:r>
+            <a:r>
+              <a:rPr lang="en-US" sz="2800" b="1" dirty="0" err="1" smtClean="0">
+                <a:solidFill>
+                  <a:srgbClr val="00B050"/>
+                </a:solidFill>
+              </a:rPr>
+              <a:t>bm</a:t>
+            </a:r>
+            <a:r>
+              <a:rPr lang="en-US" sz="2800" b="1" dirty="0" smtClean="0">
+                <a:solidFill>
+                  <a:srgbClr val="00B050"/>
+                </a:solidFill>
+              </a:rPr>
+              <a:t>)</a:t>
+            </a:r>
+            <a:endParaRPr lang="en-US" sz="2800" b="1" dirty="0">
+              <a:solidFill>
+                <a:srgbClr val="00B050"/>
+              </a:solidFill>
+            </a:endParaRPr>
+          </a:p>
+        </p:txBody>
+      </p:sp>
+      <p:sp>
+        <p:nvSpPr>
+          <p:cNvPr id="3" name="TextBox 2"/>
+          <p:cNvSpPr txBox="1"/>
+          <p:nvPr/>
+        </p:nvSpPr>
+        <p:spPr>
+          <a:xfrm>
+            <a:off x="-18742" y="1143000"/>
+            <a:ext cx="9134167" cy="1754326"/>
+          </a:xfrm>
+          <a:prstGeom prst="rect">
+            <a:avLst/>
+          </a:prstGeom>
+          <a:noFill/>
+        </p:spPr>
+        <p:txBody>
+          <a:bodyPr wrap="none" rtlCol="0">
+            <a:spAutoFit/>
+          </a:bodyPr>
+          <a:lstStyle/>
+          <a:p>
+            <a:pPr marL="457200" indent="-457200">
+              <a:buFont typeface="Arial" panose="020B0604020202020204" pitchFamily="34" charset="0"/>
+              <a:buChar char="•"/>
+            </a:pPr>
+            <a:r>
+              <a:rPr lang="en-US" sz="2400" b="1" dirty="0" smtClean="0">
+                <a:solidFill>
+                  <a:srgbClr val="FF0000"/>
+                </a:solidFill>
+              </a:rPr>
+              <a:t>When the algorithm recurs back to the root and we progress down</a:t>
+            </a:r>
+            <a:br>
+              <a:rPr lang="en-US" sz="2400" b="1" dirty="0" smtClean="0">
+                <a:solidFill>
+                  <a:srgbClr val="FF0000"/>
+                </a:solidFill>
+              </a:rPr>
+            </a:br>
+            <a:r>
+              <a:rPr lang="en-US" sz="2400" b="1" dirty="0" smtClean="0">
+                <a:solidFill>
+                  <a:srgbClr val="FF0000"/>
+                </a:solidFill>
+              </a:rPr>
+              <a:t>the next level, are we not repeating searches already done?</a:t>
+            </a:r>
+            <a:endParaRPr lang="en-US" sz="2000" b="1" dirty="0" smtClean="0">
+              <a:solidFill>
+                <a:srgbClr val="FF0000"/>
+              </a:solidFill>
+            </a:endParaRPr>
+          </a:p>
+          <a:p>
+            <a:pPr marL="457200" indent="-457200">
+              <a:buFont typeface="Arial" panose="020B0604020202020204" pitchFamily="34" charset="0"/>
+              <a:buChar char="•"/>
+            </a:pPr>
+            <a:endParaRPr lang="en-US" sz="2000" b="1" dirty="0">
+              <a:solidFill>
+                <a:srgbClr val="FF0000"/>
+              </a:solidFill>
+            </a:endParaRPr>
+          </a:p>
+          <a:p>
+            <a:r>
+              <a:rPr lang="en-US" sz="2000" b="1" dirty="0" smtClean="0">
+                <a:solidFill>
+                  <a:srgbClr val="FF0000"/>
+                </a:solidFill>
+              </a:rPr>
+              <a:t>	</a:t>
+            </a:r>
+            <a:r>
+              <a:rPr lang="en-US" sz="2000" b="1" dirty="0" smtClean="0">
+                <a:solidFill>
+                  <a:srgbClr val="00B050"/>
+                </a:solidFill>
+              </a:rPr>
+              <a:t>YES. Our time complexity goes up, but because we are not</a:t>
+            </a:r>
+          </a:p>
+          <a:p>
+            <a:r>
+              <a:rPr lang="en-US" sz="2000" b="1" dirty="0">
+                <a:solidFill>
+                  <a:srgbClr val="00B050"/>
+                </a:solidFill>
+              </a:rPr>
+              <a:t>	</a:t>
+            </a:r>
+            <a:r>
+              <a:rPr lang="en-US" sz="2000" b="1" dirty="0" smtClean="0">
+                <a:solidFill>
+                  <a:srgbClr val="00B050"/>
+                </a:solidFill>
+              </a:rPr>
+              <a:t>remembering what we visited, the space complexity goes down.</a:t>
+            </a:r>
+            <a:endParaRPr lang="en-US" sz="2000" b="1" dirty="0">
+              <a:solidFill>
+                <a:srgbClr val="00B050"/>
+              </a:solidFill>
+            </a:endParaRPr>
+          </a:p>
+        </p:txBody>
+      </p:sp>
+    </p:spTree>
+    <p:extLst>
+      <p:ext uri="{BB962C8B-B14F-4D97-AF65-F5344CB8AC3E}">
+        <p14:creationId xmlns:p14="http://schemas.microsoft.com/office/powerpoint/2010/main" val="1220729197"/>
       </p:ext>
     </p:extLst>
   </p:cSld>

</xml_diff>

<commit_message>
minor updates to presentations
</commit_message>
<xml_diff>
--- a/Presentations/AI - Graph Search.pptx
+++ b/Presentations/AI - Graph Search.pptx
@@ -218,7 +218,7 @@
           <a:p>
             <a:fld id="{FAF957FC-5175-49AC-8D2B-2F056FFFC1DD}" type="datetimeFigureOut">
               <a:rPr lang="en-US" smtClean="0"/>
-              <a:t>7/16/2017</a:t>
+              <a:t>8/2/2017</a:t>
             </a:fld>
             <a:endParaRPr lang="en-US"/>
           </a:p>
@@ -752,7 +752,7 @@
             <a:fld id="{1D8BD707-D9CF-40AE-B4C6-C98DA3205C09}" type="datetimeFigureOut">
               <a:rPr lang="en-US" smtClean="0"/>
               <a:pPr/>
-              <a:t>7/16/2017</a:t>
+              <a:t>8/2/2017</a:t>
             </a:fld>
             <a:endParaRPr lang="en-US"/>
           </a:p>
@@ -919,7 +919,7 @@
             <a:fld id="{1D8BD707-D9CF-40AE-B4C6-C98DA3205C09}" type="datetimeFigureOut">
               <a:rPr lang="en-US" smtClean="0"/>
               <a:pPr/>
-              <a:t>7/16/2017</a:t>
+              <a:t>8/2/2017</a:t>
             </a:fld>
             <a:endParaRPr lang="en-US"/>
           </a:p>
@@ -1096,7 +1096,7 @@
             <a:fld id="{1D8BD707-D9CF-40AE-B4C6-C98DA3205C09}" type="datetimeFigureOut">
               <a:rPr lang="en-US" smtClean="0"/>
               <a:pPr/>
-              <a:t>7/16/2017</a:t>
+              <a:t>8/2/2017</a:t>
             </a:fld>
             <a:endParaRPr lang="en-US"/>
           </a:p>
@@ -1263,7 +1263,7 @@
             <a:fld id="{1D8BD707-D9CF-40AE-B4C6-C98DA3205C09}" type="datetimeFigureOut">
               <a:rPr lang="en-US" smtClean="0"/>
               <a:pPr/>
-              <a:t>7/16/2017</a:t>
+              <a:t>8/2/2017</a:t>
             </a:fld>
             <a:endParaRPr lang="en-US"/>
           </a:p>
@@ -1506,7 +1506,7 @@
             <a:fld id="{1D8BD707-D9CF-40AE-B4C6-C98DA3205C09}" type="datetimeFigureOut">
               <a:rPr lang="en-US" smtClean="0"/>
               <a:pPr/>
-              <a:t>7/16/2017</a:t>
+              <a:t>8/2/2017</a:t>
             </a:fld>
             <a:endParaRPr lang="en-US"/>
           </a:p>
@@ -1791,7 +1791,7 @@
             <a:fld id="{1D8BD707-D9CF-40AE-B4C6-C98DA3205C09}" type="datetimeFigureOut">
               <a:rPr lang="en-US" smtClean="0"/>
               <a:pPr/>
-              <a:t>7/16/2017</a:t>
+              <a:t>8/2/2017</a:t>
             </a:fld>
             <a:endParaRPr lang="en-US"/>
           </a:p>
@@ -2210,7 +2210,7 @@
             <a:fld id="{1D8BD707-D9CF-40AE-B4C6-C98DA3205C09}" type="datetimeFigureOut">
               <a:rPr lang="en-US" smtClean="0"/>
               <a:pPr/>
-              <a:t>7/16/2017</a:t>
+              <a:t>8/2/2017</a:t>
             </a:fld>
             <a:endParaRPr lang="en-US"/>
           </a:p>
@@ -2325,7 +2325,7 @@
             <a:fld id="{1D8BD707-D9CF-40AE-B4C6-C98DA3205C09}" type="datetimeFigureOut">
               <a:rPr lang="en-US" smtClean="0"/>
               <a:pPr/>
-              <a:t>7/16/2017</a:t>
+              <a:t>8/2/2017</a:t>
             </a:fld>
             <a:endParaRPr lang="en-US"/>
           </a:p>
@@ -2417,7 +2417,7 @@
             <a:fld id="{1D8BD707-D9CF-40AE-B4C6-C98DA3205C09}" type="datetimeFigureOut">
               <a:rPr lang="en-US" smtClean="0"/>
               <a:pPr/>
-              <a:t>7/16/2017</a:t>
+              <a:t>8/2/2017</a:t>
             </a:fld>
             <a:endParaRPr lang="en-US"/>
           </a:p>
@@ -2691,7 +2691,7 @@
             <a:fld id="{1D8BD707-D9CF-40AE-B4C6-C98DA3205C09}" type="datetimeFigureOut">
               <a:rPr lang="en-US" smtClean="0"/>
               <a:pPr/>
-              <a:t>7/16/2017</a:t>
+              <a:t>8/2/2017</a:t>
             </a:fld>
             <a:endParaRPr lang="en-US"/>
           </a:p>
@@ -2941,7 +2941,7 @@
             <a:fld id="{1D8BD707-D9CF-40AE-B4C6-C98DA3205C09}" type="datetimeFigureOut">
               <a:rPr lang="en-US" smtClean="0"/>
               <a:pPr/>
-              <a:t>7/16/2017</a:t>
+              <a:t>8/2/2017</a:t>
             </a:fld>
             <a:endParaRPr lang="en-US"/>
           </a:p>
@@ -3151,7 +3151,7 @@
             <a:fld id="{1D8BD707-D9CF-40AE-B4C6-C98DA3205C09}" type="datetimeFigureOut">
               <a:rPr lang="en-US" smtClean="0"/>
               <a:pPr/>
-              <a:t>7/16/2017</a:t>
+              <a:t>8/2/2017</a:t>
             </a:fld>
             <a:endParaRPr lang="en-US"/>
           </a:p>
@@ -3932,7 +3932,7 @@
         <p:spPr bwMode="auto">
           <a:xfrm>
             <a:off x="982716" y="1187678"/>
-            <a:ext cx="7178568" cy="4832092"/>
+            <a:ext cx="7427033" cy="4832092"/>
           </a:xfrm>
           <a:prstGeom prst="rect">
             <a:avLst/>
@@ -4145,7 +4145,35 @@
                 <a:latin typeface="Arial Unicode MS" pitchFamily="34" charset="-128"/>
                 <a:cs typeface="Arial" pitchFamily="34" charset="0"/>
               </a:rPr>
-              <a:t>	if root == None: </a:t>
+              <a:t>	if root </a:t>
+            </a:r>
+            <a:r>
+              <a:rPr kumimoji="0" lang="en-US" altLang="en-US" sz="1400" b="0" i="0" u="none" strike="noStrike" cap="none" normalizeH="0" baseline="0" dirty="0" smtClean="0">
+                <a:ln>
+                  <a:noFill/>
+                </a:ln>
+                <a:solidFill>
+                  <a:schemeClr val="tx1"/>
+                </a:solidFill>
+                <a:effectLst/>
+                <a:latin typeface="Arial Unicode MS" pitchFamily="34" charset="-128"/>
+                <a:cs typeface="Arial" pitchFamily="34" charset="0"/>
+              </a:rPr>
+              <a:t>is </a:t>
+            </a:r>
+            <a:r>
+              <a:rPr kumimoji="0" lang="en-US" altLang="en-US" sz="1400" b="0" i="0" u="none" strike="noStrike" cap="none" normalizeH="0" baseline="0" dirty="0" smtClean="0">
+                <a:ln>
+                  <a:noFill/>
+                </a:ln>
+                <a:solidFill>
+                  <a:schemeClr val="tx1"/>
+                </a:solidFill>
+                <a:effectLst/>
+                <a:latin typeface="Arial Unicode MS" pitchFamily="34" charset="-128"/>
+                <a:cs typeface="Arial" pitchFamily="34" charset="0"/>
+              </a:rPr>
+              <a:t>None: </a:t>
             </a:r>
             <a:br>
               <a:rPr kumimoji="0" lang="en-US" altLang="en-US" sz="1400" b="0" i="0" u="none" strike="noStrike" cap="none" normalizeH="0" baseline="0" dirty="0" smtClean="0">
@@ -4404,7 +4432,45 @@
                 <a:latin typeface="Arial Unicode MS" pitchFamily="34" charset="-128"/>
                 <a:cs typeface="Arial" pitchFamily="34" charset="0"/>
               </a:rPr>
-              <a:t># sequentially visit in node in level order as it is dynamically added to the list </a:t>
+              <a:t># sequentially visit </a:t>
+            </a:r>
+            <a:r>
+              <a:rPr lang="en-US" altLang="en-US" sz="1400" dirty="0" smtClean="0">
+                <a:solidFill>
+                  <a:srgbClr val="00B050"/>
+                </a:solidFill>
+                <a:latin typeface="Arial Unicode MS" pitchFamily="34" charset="-128"/>
+                <a:cs typeface="Arial" pitchFamily="34" charset="0"/>
+              </a:rPr>
+              <a:t>each</a:t>
+            </a:r>
+            <a:r>
+              <a:rPr kumimoji="0" lang="en-US" altLang="en-US" sz="1400" b="0" i="0" u="none" strike="noStrike" cap="none" normalizeH="0" baseline="0" dirty="0" smtClean="0">
+                <a:ln>
+                  <a:noFill/>
+                </a:ln>
+                <a:solidFill>
+                  <a:srgbClr val="00B050"/>
+                </a:solidFill>
+                <a:effectLst/>
+                <a:latin typeface="Arial Unicode MS" pitchFamily="34" charset="-128"/>
+                <a:cs typeface="Arial" pitchFamily="34" charset="0"/>
+              </a:rPr>
+              <a:t> </a:t>
+            </a:r>
+            <a:r>
+              <a:rPr kumimoji="0" lang="en-US" altLang="en-US" sz="1400" b="0" i="0" u="none" strike="noStrike" cap="none" normalizeH="0" baseline="0" dirty="0" smtClean="0">
+                <a:ln>
+                  <a:noFill/>
+                </a:ln>
+                <a:solidFill>
+                  <a:srgbClr val="00B050"/>
+                </a:solidFill>
+                <a:effectLst/>
+                <a:latin typeface="Arial Unicode MS" pitchFamily="34" charset="-128"/>
+                <a:cs typeface="Arial" pitchFamily="34" charset="0"/>
+              </a:rPr>
+              <a:t>node in level order as it is dynamically added to the list </a:t>
             </a:r>
           </a:p>
           <a:p>
@@ -4457,7 +4523,35 @@
                 <a:latin typeface="Arial Unicode MS" pitchFamily="34" charset="-128"/>
                 <a:cs typeface="Arial" pitchFamily="34" charset="0"/>
               </a:rPr>
-              <a:t> = 0 </a:t>
+              <a:t> = </a:t>
+            </a:r>
+            <a:r>
+              <a:rPr kumimoji="0" lang="en-US" altLang="en-US" sz="1400" b="0" i="0" u="none" strike="noStrike" cap="none" normalizeH="0" baseline="0" dirty="0" smtClean="0">
+                <a:ln>
+                  <a:noFill/>
+                </a:ln>
+                <a:solidFill>
+                  <a:schemeClr val="tx1"/>
+                </a:solidFill>
+                <a:effectLst/>
+                <a:latin typeface="Arial Unicode MS" pitchFamily="34" charset="-128"/>
+                <a:cs typeface="Arial" pitchFamily="34" charset="0"/>
+              </a:rPr>
+              <a:t>0 </a:t>
+            </a:r>
+            <a:r>
+              <a:rPr kumimoji="0" lang="en-US" altLang="en-US" sz="1400" b="0" i="0" u="none" strike="noStrike" cap="none" normalizeH="0" baseline="0" dirty="0" smtClean="0">
+                <a:ln>
+                  <a:noFill/>
+                </a:ln>
+                <a:solidFill>
+                  <a:schemeClr val="tx1"/>
+                </a:solidFill>
+                <a:effectLst/>
+                <a:latin typeface="Arial Unicode MS" pitchFamily="34" charset="-128"/>
+                <a:cs typeface="Arial" pitchFamily="34" charset="0"/>
+              </a:rPr>
+              <a:t/>
             </a:r>
             <a:br>
               <a:rPr kumimoji="0" lang="en-US" altLang="en-US" sz="1400" b="0" i="0" u="none" strike="noStrike" cap="none" normalizeH="0" baseline="0" dirty="0" smtClean="0">
@@ -4836,7 +4930,35 @@
                 <a:latin typeface="Arial Unicode MS" pitchFamily="34" charset="-128"/>
                 <a:cs typeface="Arial" pitchFamily="34" charset="0"/>
               </a:rPr>
-              <a:t>.Left() != None: </a:t>
+              <a:t>.Left() </a:t>
+            </a:r>
+            <a:r>
+              <a:rPr kumimoji="0" lang="en-US" altLang="en-US" sz="1400" b="0" i="0" u="none" strike="noStrike" cap="none" normalizeH="0" baseline="0" dirty="0" smtClean="0">
+                <a:ln>
+                  <a:noFill/>
+                </a:ln>
+                <a:solidFill>
+                  <a:schemeClr val="tx1"/>
+                </a:solidFill>
+                <a:effectLst/>
+                <a:latin typeface="Arial Unicode MS" pitchFamily="34" charset="-128"/>
+                <a:cs typeface="Arial" pitchFamily="34" charset="0"/>
+              </a:rPr>
+              <a:t>is not </a:t>
+            </a:r>
+            <a:r>
+              <a:rPr kumimoji="0" lang="en-US" altLang="en-US" sz="1400" b="0" i="0" u="none" strike="noStrike" cap="none" normalizeH="0" baseline="0" dirty="0" smtClean="0">
+                <a:ln>
+                  <a:noFill/>
+                </a:ln>
+                <a:solidFill>
+                  <a:schemeClr val="tx1"/>
+                </a:solidFill>
+                <a:effectLst/>
+                <a:latin typeface="Arial Unicode MS" pitchFamily="34" charset="-128"/>
+                <a:cs typeface="Arial" pitchFamily="34" charset="0"/>
+              </a:rPr>
+              <a:t>None: </a:t>
             </a:r>
           </a:p>
           <a:p>
@@ -5035,7 +5157,35 @@
                 <a:latin typeface="Arial Unicode MS" pitchFamily="34" charset="-128"/>
                 <a:cs typeface="Arial" pitchFamily="34" charset="0"/>
               </a:rPr>
-              <a:t>.Right() != None: </a:t>
+              <a:t>.Right() </a:t>
+            </a:r>
+            <a:r>
+              <a:rPr kumimoji="0" lang="en-US" altLang="en-US" sz="1400" b="0" i="0" u="none" strike="noStrike" cap="none" normalizeH="0" baseline="0" dirty="0" smtClean="0">
+                <a:ln>
+                  <a:noFill/>
+                </a:ln>
+                <a:solidFill>
+                  <a:schemeClr val="tx1"/>
+                </a:solidFill>
+                <a:effectLst/>
+                <a:latin typeface="Arial Unicode MS" pitchFamily="34" charset="-128"/>
+                <a:cs typeface="Arial" pitchFamily="34" charset="0"/>
+              </a:rPr>
+              <a:t>is not </a:t>
+            </a:r>
+            <a:r>
+              <a:rPr kumimoji="0" lang="en-US" altLang="en-US" sz="1400" b="0" i="0" u="none" strike="noStrike" cap="none" normalizeH="0" baseline="0" dirty="0" smtClean="0">
+                <a:ln>
+                  <a:noFill/>
+                </a:ln>
+                <a:solidFill>
+                  <a:schemeClr val="tx1"/>
+                </a:solidFill>
+                <a:effectLst/>
+                <a:latin typeface="Arial Unicode MS" pitchFamily="34" charset="-128"/>
+                <a:cs typeface="Arial" pitchFamily="34" charset="0"/>
+              </a:rPr>
+              <a:t>None: </a:t>
             </a:r>
             <a:br>
               <a:rPr kumimoji="0" lang="en-US" altLang="en-US" sz="1400" b="0" i="0" u="none" strike="noStrike" cap="none" normalizeH="0" baseline="0" dirty="0" smtClean="0">
@@ -6320,7 +6470,7 @@
                 <a:latin typeface="Arial Unicode MS" pitchFamily="34" charset="-128"/>
                 <a:cs typeface="Arial" pitchFamily="34" charset="0"/>
               </a:rPr>
-              <a:t>#</a:t>
+              <a:t># </a:t>
             </a:r>
             <a:r>
               <a:rPr kumimoji="0" lang="en-US" altLang="en-US" sz="1400" b="0" i="0" u="none" strike="noStrike" cap="none" normalizeH="0" baseline="0" dirty="0" err="1" smtClean="0">
@@ -6348,7 +6498,21 @@
                 <a:latin typeface="Arial Unicode MS" pitchFamily="34" charset="-128"/>
                 <a:cs typeface="Arial" pitchFamily="34" charset="0"/>
               </a:rPr>
-              <a:t> Traversal </a:t>
+              <a:t> </a:t>
+            </a:r>
+            <a:r>
+              <a:rPr kumimoji="0" lang="en-US" altLang="en-US" sz="1400" b="0" i="0" u="none" strike="noStrike" cap="none" normalizeH="0" baseline="0" dirty="0" smtClean="0">
+                <a:ln>
+                  <a:noFill/>
+                </a:ln>
+                <a:solidFill>
+                  <a:srgbClr val="00B050"/>
+                </a:solidFill>
+                <a:effectLst/>
+                <a:latin typeface="Arial Unicode MS" pitchFamily="34" charset="-128"/>
+                <a:cs typeface="Arial" pitchFamily="34" charset="0"/>
+              </a:rPr>
+              <a:t>Traversal </a:t>
             </a:r>
             <a:r>
               <a:rPr kumimoji="0" lang="en-US" altLang="en-US" sz="1400" b="0" i="0" u="none" strike="noStrike" cap="none" normalizeH="0" baseline="0" dirty="0" smtClean="0">
@@ -6458,35 +6622,7 @@
                 <a:latin typeface="Arial Unicode MS" pitchFamily="34" charset="-128"/>
                 <a:cs typeface="Arial" pitchFamily="34" charset="0"/>
               </a:rPr>
-              <a:t>	if root </a:t>
-            </a:r>
-            <a:r>
-              <a:rPr kumimoji="0" lang="en-US" altLang="en-US" sz="1400" b="0" i="0" u="none" strike="noStrike" cap="none" normalizeH="0" baseline="0" dirty="0" smtClean="0">
-                <a:ln>
-                  <a:noFill/>
-                </a:ln>
-                <a:solidFill>
-                  <a:schemeClr val="tx1"/>
-                </a:solidFill>
-                <a:effectLst/>
-                <a:latin typeface="Arial Unicode MS" pitchFamily="34" charset="-128"/>
-                <a:cs typeface="Arial" pitchFamily="34" charset="0"/>
-              </a:rPr>
-              <a:t>is </a:t>
-            </a:r>
-            <a:r>
-              <a:rPr kumimoji="0" lang="en-US" altLang="en-US" sz="1400" b="0" i="0" u="none" strike="noStrike" cap="none" normalizeH="0" baseline="0" dirty="0" smtClean="0">
-                <a:ln>
-                  <a:noFill/>
-                </a:ln>
-                <a:solidFill>
-                  <a:schemeClr val="tx1"/>
-                </a:solidFill>
-                <a:effectLst/>
-                <a:latin typeface="Arial Unicode MS" pitchFamily="34" charset="-128"/>
-                <a:cs typeface="Arial" pitchFamily="34" charset="0"/>
-              </a:rPr>
-              <a:t>None: </a:t>
+              <a:t>	if root is None: </a:t>
             </a:r>
             <a:br>
               <a:rPr kumimoji="0" lang="en-US" altLang="en-US" sz="1400" b="0" i="0" u="none" strike="noStrike" cap="none" normalizeH="0" baseline="0" dirty="0" smtClean="0">
@@ -7876,7 +8012,7 @@
                 <a:latin typeface="Arial Unicode MS" pitchFamily="34" charset="-128"/>
                 <a:cs typeface="Arial" pitchFamily="34" charset="0"/>
               </a:rPr>
-              <a:t>#</a:t>
+              <a:t># </a:t>
             </a:r>
             <a:r>
               <a:rPr kumimoji="0" lang="en-US" altLang="en-US" sz="1400" b="0" i="0" u="none" strike="noStrike" cap="none" normalizeH="0" baseline="0" dirty="0" err="1" smtClean="0">
@@ -7904,7 +8040,21 @@
                 <a:latin typeface="Arial Unicode MS" pitchFamily="34" charset="-128"/>
                 <a:cs typeface="Arial" pitchFamily="34" charset="0"/>
               </a:rPr>
-              <a:t> Traversal </a:t>
+              <a:t> </a:t>
+            </a:r>
+            <a:r>
+              <a:rPr kumimoji="0" lang="en-US" altLang="en-US" sz="1400" b="0" i="0" u="none" strike="noStrike" cap="none" normalizeH="0" baseline="0" dirty="0" smtClean="0">
+                <a:ln>
+                  <a:noFill/>
+                </a:ln>
+                <a:solidFill>
+                  <a:srgbClr val="00B050"/>
+                </a:solidFill>
+                <a:effectLst/>
+                <a:latin typeface="Arial Unicode MS" pitchFamily="34" charset="-128"/>
+                <a:cs typeface="Arial" pitchFamily="34" charset="0"/>
+              </a:rPr>
+              <a:t>Traversal </a:t>
             </a:r>
             <a:r>
               <a:rPr kumimoji="0" lang="en-US" altLang="en-US" sz="1400" b="0" i="0" u="none" strike="noStrike" cap="none" normalizeH="0" baseline="0" dirty="0" smtClean="0">
@@ -8014,35 +8164,7 @@
                 <a:latin typeface="Arial Unicode MS" pitchFamily="34" charset="-128"/>
                 <a:cs typeface="Arial" pitchFamily="34" charset="0"/>
               </a:rPr>
-              <a:t>	if root </a:t>
-            </a:r>
-            <a:r>
-              <a:rPr kumimoji="0" lang="en-US" altLang="en-US" sz="1400" b="0" i="0" u="none" strike="noStrike" cap="none" normalizeH="0" baseline="0" dirty="0" smtClean="0">
-                <a:ln>
-                  <a:noFill/>
-                </a:ln>
-                <a:solidFill>
-                  <a:schemeClr val="tx1"/>
-                </a:solidFill>
-                <a:effectLst/>
-                <a:latin typeface="Arial Unicode MS" pitchFamily="34" charset="-128"/>
-                <a:cs typeface="Arial" pitchFamily="34" charset="0"/>
-              </a:rPr>
-              <a:t>is </a:t>
-            </a:r>
-            <a:r>
-              <a:rPr kumimoji="0" lang="en-US" altLang="en-US" sz="1400" b="0" i="0" u="none" strike="noStrike" cap="none" normalizeH="0" baseline="0" dirty="0" smtClean="0">
-                <a:ln>
-                  <a:noFill/>
-                </a:ln>
-                <a:solidFill>
-                  <a:schemeClr val="tx1"/>
-                </a:solidFill>
-                <a:effectLst/>
-                <a:latin typeface="Arial Unicode MS" pitchFamily="34" charset="-128"/>
-                <a:cs typeface="Arial" pitchFamily="34" charset="0"/>
-              </a:rPr>
-              <a:t>None: </a:t>
+              <a:t>	if root is None: </a:t>
             </a:r>
             <a:br>
               <a:rPr kumimoji="0" lang="en-US" altLang="en-US" sz="1400" b="0" i="0" u="none" strike="noStrike" cap="none" normalizeH="0" baseline="0" dirty="0" smtClean="0">
@@ -9481,7 +9603,7 @@
                 <a:latin typeface="Arial Unicode MS" pitchFamily="34" charset="-128"/>
                 <a:cs typeface="Arial" pitchFamily="34" charset="0"/>
               </a:rPr>
-              <a:t>#</a:t>
+              <a:t># </a:t>
             </a:r>
             <a:r>
               <a:rPr kumimoji="0" lang="en-US" altLang="en-US" sz="1400" b="0" i="0" u="none" strike="noStrike" cap="none" normalizeH="0" baseline="0" dirty="0" err="1" smtClean="0">
@@ -9509,7 +9631,21 @@
                 <a:latin typeface="Arial Unicode MS" pitchFamily="34" charset="-128"/>
                 <a:cs typeface="Arial" pitchFamily="34" charset="0"/>
               </a:rPr>
-              <a:t> Traversal </a:t>
+              <a:t> </a:t>
+            </a:r>
+            <a:r>
+              <a:rPr kumimoji="0" lang="en-US" altLang="en-US" sz="1400" b="0" i="0" u="none" strike="noStrike" cap="none" normalizeH="0" baseline="0" dirty="0" smtClean="0">
+                <a:ln>
+                  <a:noFill/>
+                </a:ln>
+                <a:solidFill>
+                  <a:srgbClr val="00B050"/>
+                </a:solidFill>
+                <a:effectLst/>
+                <a:latin typeface="Arial Unicode MS" pitchFamily="34" charset="-128"/>
+                <a:cs typeface="Arial" pitchFamily="34" charset="0"/>
+              </a:rPr>
+              <a:t>Traversal </a:t>
             </a:r>
             <a:r>
               <a:rPr kumimoji="0" lang="en-US" altLang="en-US" sz="1400" b="0" i="0" u="none" strike="noStrike" cap="none" normalizeH="0" baseline="0" dirty="0" smtClean="0">
@@ -9619,35 +9755,7 @@
                 <a:latin typeface="Arial Unicode MS" pitchFamily="34" charset="-128"/>
                 <a:cs typeface="Arial" pitchFamily="34" charset="0"/>
               </a:rPr>
-              <a:t>	if root </a:t>
-            </a:r>
-            <a:r>
-              <a:rPr kumimoji="0" lang="en-US" altLang="en-US" sz="1400" b="0" i="0" u="none" strike="noStrike" cap="none" normalizeH="0" baseline="0" dirty="0" smtClean="0">
-                <a:ln>
-                  <a:noFill/>
-                </a:ln>
-                <a:solidFill>
-                  <a:schemeClr val="tx1"/>
-                </a:solidFill>
-                <a:effectLst/>
-                <a:latin typeface="Arial Unicode MS" pitchFamily="34" charset="-128"/>
-                <a:cs typeface="Arial" pitchFamily="34" charset="0"/>
-              </a:rPr>
-              <a:t>is </a:t>
-            </a:r>
-            <a:r>
-              <a:rPr kumimoji="0" lang="en-US" altLang="en-US" sz="1400" b="0" i="0" u="none" strike="noStrike" cap="none" normalizeH="0" baseline="0" dirty="0" smtClean="0">
-                <a:ln>
-                  <a:noFill/>
-                </a:ln>
-                <a:solidFill>
-                  <a:schemeClr val="tx1"/>
-                </a:solidFill>
-                <a:effectLst/>
-                <a:latin typeface="Arial Unicode MS" pitchFamily="34" charset="-128"/>
-                <a:cs typeface="Arial" pitchFamily="34" charset="0"/>
-              </a:rPr>
-              <a:t>None: </a:t>
+              <a:t>	if root is None: </a:t>
             </a:r>
             <a:br>
               <a:rPr kumimoji="0" lang="en-US" altLang="en-US" sz="1400" b="0" i="0" u="none" strike="noStrike" cap="none" normalizeH="0" baseline="0" dirty="0" smtClean="0">
@@ -22515,16 +22623,12 @@
               <a:t>class </a:t>
             </a:r>
             <a:r>
-              <a:rPr lang="en-US" sz="1400" dirty="0" err="1"/>
+              <a:rPr lang="en-US" sz="1400" dirty="0" err="1" smtClean="0"/>
               <a:t>BinaryTree</a:t>
             </a:r>
             <a:r>
-              <a:rPr lang="en-US" sz="1400" dirty="0"/>
-              <a:t>: </a:t>
-            </a:r>
-            <a:r>
               <a:rPr lang="en-US" sz="1400" dirty="0" smtClean="0"/>
-              <a:t/>
+              <a:t>(object): </a:t>
             </a:r>
             <a:br>
               <a:rPr lang="en-US" sz="1400" dirty="0" smtClean="0"/>
@@ -22539,7 +22643,7 @@
                   <a:srgbClr val="00B050"/>
                 </a:solidFill>
               </a:rPr>
-              <a:t># </a:t>
+              <a:t># Constructor</a:t>
             </a:r>
             <a:r>
               <a:rPr lang="en-US" sz="1400" dirty="0">
@@ -22547,7 +22651,7 @@
                   <a:srgbClr val="00B050"/>
                 </a:solidFill>
               </a:rPr>
-              <a:t>Constructor: set the node data and left/right subtrees to null </a:t>
+              <a:t>: set the node data and left/right subtrees to null </a:t>
             </a:r>
             <a:r>
               <a:rPr lang="en-US" sz="1400" dirty="0" smtClean="0">
@@ -22807,15 +22911,7 @@
             </a:br>
             <a:r>
               <a:rPr lang="en-US" sz="1400" dirty="0" smtClean="0"/>
-              <a:t>		if left </a:t>
-            </a:r>
-            <a:r>
-              <a:rPr lang="en-US" sz="1400" dirty="0" smtClean="0"/>
-              <a:t>is None</a:t>
-            </a:r>
-            <a:r>
-              <a:rPr lang="en-US" sz="1400" dirty="0" smtClean="0"/>
-              <a:t>:</a:t>
+              <a:t>		if left is None:</a:t>
             </a:r>
           </a:p>
           <a:p>
@@ -22915,15 +23011,7 @@
             </a:r>
             <a:r>
               <a:rPr lang="en-US" sz="1400" dirty="0" smtClean="0"/>
-              <a:t>	if right </a:t>
-            </a:r>
-            <a:r>
-              <a:rPr lang="en-US" sz="1400" dirty="0" smtClean="0"/>
-              <a:t>is </a:t>
-            </a:r>
-            <a:r>
-              <a:rPr lang="en-US" sz="1400" dirty="0" smtClean="0"/>
-              <a:t>None:</a:t>
+              <a:t>	if right is None:</a:t>
             </a:r>
           </a:p>
           <a:p>
@@ -23036,15 +23124,7 @@
             </a:br>
             <a:r>
               <a:rPr lang="en-US" sz="1400" dirty="0" smtClean="0"/>
-              <a:t>		if key </a:t>
-            </a:r>
-            <a:r>
-              <a:rPr lang="en-US" sz="1400" dirty="0" smtClean="0"/>
-              <a:t>is </a:t>
-            </a:r>
-            <a:r>
-              <a:rPr lang="en-US" sz="1400" dirty="0" smtClean="0"/>
-              <a:t>None:</a:t>
+              <a:t>		if key is None:</a:t>
             </a:r>
           </a:p>
           <a:p>

</xml_diff>